<commit_message>
linear regression pic3까지 업로드
</commit_message>
<xml_diff>
--- a/pics/2020-08-24-linear_regression/pics.pptx
+++ b/pics/2020-08-24-linear_regression/pics.pptx
@@ -104,6 +104,22 @@
       </a:defRPr>
     </a:lvl9pPr>
   </p:defaultTextStyle>
+  <p:extLst>
+    <p:ext uri="{EFAFB233-063F-42B5-8137-9DF3F51BA10A}">
+      <p15:sldGuideLst xmlns:p15="http://schemas.microsoft.com/office/powerpoint/2012/main">
+        <p15:guide id="1" orient="horz" pos="2160">
+          <p15:clr>
+            <a:srgbClr val="A4A3A4"/>
+          </p15:clr>
+        </p15:guide>
+        <p15:guide id="2" pos="2880">
+          <p15:clr>
+            <a:srgbClr val="A4A3A4"/>
+          </p15:clr>
+        </p15:guide>
+      </p15:sldGuideLst>
+    </p:ext>
+  </p:extLst>
 </p:presentation>
 </file>
 
@@ -145,10 +161,9 @@
           <a:lstStyle/>
           <a:p>
             <a:r>
-              <a:rPr lang="ko-KR" altLang="en-US" smtClean="0"/>
+              <a:rPr lang="ko-KR" altLang="en-US"/>
               <a:t>마스터 제목 스타일 편집</a:t>
             </a:r>
-            <a:endParaRPr lang="ko-KR" altLang="en-US"/>
           </a:p>
         </p:txBody>
       </p:sp>
@@ -264,10 +279,9 @@
           </a:lstStyle>
           <a:p>
             <a:r>
-              <a:rPr lang="ko-KR" altLang="en-US" smtClean="0"/>
+              <a:rPr lang="ko-KR" altLang="en-US"/>
               <a:t>마스터 부제목 스타일 편집</a:t>
             </a:r>
-            <a:endParaRPr lang="ko-KR" altLang="en-US"/>
           </a:p>
         </p:txBody>
       </p:sp>
@@ -288,7 +302,7 @@
           <a:p>
             <a:fld id="{FB30EDBD-1C2D-4C1E-B459-B60219FAB484}" type="datetimeFigureOut">
               <a:rPr lang="ko-KR" altLang="en-US" smtClean="0"/>
-              <a:t>2020-09-02</a:t>
+              <a:t>2020-09-03</a:t>
             </a:fld>
             <a:endParaRPr lang="ko-KR" altLang="en-US"/>
           </a:p>
@@ -377,10 +391,9 @@
           <a:lstStyle/>
           <a:p>
             <a:r>
-              <a:rPr lang="ko-KR" altLang="en-US" smtClean="0"/>
+              <a:rPr lang="ko-KR" altLang="en-US"/>
               <a:t>마스터 제목 스타일 편집</a:t>
             </a:r>
-            <a:endParaRPr lang="ko-KR" altLang="en-US"/>
           </a:p>
         </p:txBody>
       </p:sp>
@@ -401,38 +414,37 @@
           <a:p>
             <a:pPr lvl="0"/>
             <a:r>
-              <a:rPr lang="ko-KR" altLang="en-US" smtClean="0"/>
+              <a:rPr lang="ko-KR" altLang="en-US"/>
               <a:t>마스터 텍스트 스타일을 편집합니다</a:t>
             </a:r>
           </a:p>
           <a:p>
             <a:pPr lvl="1"/>
             <a:r>
-              <a:rPr lang="ko-KR" altLang="en-US" smtClean="0"/>
+              <a:rPr lang="ko-KR" altLang="en-US"/>
               <a:t>둘째 수준</a:t>
             </a:r>
           </a:p>
           <a:p>
             <a:pPr lvl="2"/>
             <a:r>
-              <a:rPr lang="ko-KR" altLang="en-US" smtClean="0"/>
+              <a:rPr lang="ko-KR" altLang="en-US"/>
               <a:t>셋째 수준</a:t>
             </a:r>
           </a:p>
           <a:p>
             <a:pPr lvl="3"/>
             <a:r>
-              <a:rPr lang="ko-KR" altLang="en-US" smtClean="0"/>
+              <a:rPr lang="ko-KR" altLang="en-US"/>
               <a:t>넷째 수준</a:t>
             </a:r>
           </a:p>
           <a:p>
             <a:pPr lvl="4"/>
             <a:r>
-              <a:rPr lang="ko-KR" altLang="en-US" smtClean="0"/>
+              <a:rPr lang="ko-KR" altLang="en-US"/>
               <a:t>다섯째 수준</a:t>
             </a:r>
-            <a:endParaRPr lang="ko-KR" altLang="en-US"/>
           </a:p>
         </p:txBody>
       </p:sp>
@@ -453,7 +465,7 @@
           <a:p>
             <a:fld id="{FB30EDBD-1C2D-4C1E-B459-B60219FAB484}" type="datetimeFigureOut">
               <a:rPr lang="ko-KR" altLang="en-US" smtClean="0"/>
-              <a:t>2020-09-02</a:t>
+              <a:t>2020-09-03</a:t>
             </a:fld>
             <a:endParaRPr lang="ko-KR" altLang="en-US"/>
           </a:p>
@@ -547,10 +559,9 @@
           <a:lstStyle/>
           <a:p>
             <a:r>
-              <a:rPr lang="ko-KR" altLang="en-US" smtClean="0"/>
+              <a:rPr lang="ko-KR" altLang="en-US"/>
               <a:t>마스터 제목 스타일 편집</a:t>
             </a:r>
-            <a:endParaRPr lang="ko-KR" altLang="en-US"/>
           </a:p>
         </p:txBody>
       </p:sp>
@@ -576,38 +587,37 @@
           <a:p>
             <a:pPr lvl="0"/>
             <a:r>
-              <a:rPr lang="ko-KR" altLang="en-US" smtClean="0"/>
+              <a:rPr lang="ko-KR" altLang="en-US"/>
               <a:t>마스터 텍스트 스타일을 편집합니다</a:t>
             </a:r>
           </a:p>
           <a:p>
             <a:pPr lvl="1"/>
             <a:r>
-              <a:rPr lang="ko-KR" altLang="en-US" smtClean="0"/>
+              <a:rPr lang="ko-KR" altLang="en-US"/>
               <a:t>둘째 수준</a:t>
             </a:r>
           </a:p>
           <a:p>
             <a:pPr lvl="2"/>
             <a:r>
-              <a:rPr lang="ko-KR" altLang="en-US" smtClean="0"/>
+              <a:rPr lang="ko-KR" altLang="en-US"/>
               <a:t>셋째 수준</a:t>
             </a:r>
           </a:p>
           <a:p>
             <a:pPr lvl="3"/>
             <a:r>
-              <a:rPr lang="ko-KR" altLang="en-US" smtClean="0"/>
+              <a:rPr lang="ko-KR" altLang="en-US"/>
               <a:t>넷째 수준</a:t>
             </a:r>
           </a:p>
           <a:p>
             <a:pPr lvl="4"/>
             <a:r>
-              <a:rPr lang="ko-KR" altLang="en-US" smtClean="0"/>
+              <a:rPr lang="ko-KR" altLang="en-US"/>
               <a:t>다섯째 수준</a:t>
             </a:r>
-            <a:endParaRPr lang="ko-KR" altLang="en-US"/>
           </a:p>
         </p:txBody>
       </p:sp>
@@ -628,7 +638,7 @@
           <a:p>
             <a:fld id="{FB30EDBD-1C2D-4C1E-B459-B60219FAB484}" type="datetimeFigureOut">
               <a:rPr lang="ko-KR" altLang="en-US" smtClean="0"/>
-              <a:t>2020-09-02</a:t>
+              <a:t>2020-09-03</a:t>
             </a:fld>
             <a:endParaRPr lang="ko-KR" altLang="en-US"/>
           </a:p>
@@ -717,10 +727,9 @@
           <a:lstStyle/>
           <a:p>
             <a:r>
-              <a:rPr lang="ko-KR" altLang="en-US" smtClean="0"/>
+              <a:rPr lang="ko-KR" altLang="en-US"/>
               <a:t>마스터 제목 스타일 편집</a:t>
             </a:r>
-            <a:endParaRPr lang="ko-KR" altLang="en-US"/>
           </a:p>
         </p:txBody>
       </p:sp>
@@ -741,38 +750,37 @@
           <a:p>
             <a:pPr lvl="0"/>
             <a:r>
-              <a:rPr lang="ko-KR" altLang="en-US" smtClean="0"/>
+              <a:rPr lang="ko-KR" altLang="en-US"/>
               <a:t>마스터 텍스트 스타일을 편집합니다</a:t>
             </a:r>
           </a:p>
           <a:p>
             <a:pPr lvl="1"/>
             <a:r>
-              <a:rPr lang="ko-KR" altLang="en-US" smtClean="0"/>
+              <a:rPr lang="ko-KR" altLang="en-US"/>
               <a:t>둘째 수준</a:t>
             </a:r>
           </a:p>
           <a:p>
             <a:pPr lvl="2"/>
             <a:r>
-              <a:rPr lang="ko-KR" altLang="en-US" smtClean="0"/>
+              <a:rPr lang="ko-KR" altLang="en-US"/>
               <a:t>셋째 수준</a:t>
             </a:r>
           </a:p>
           <a:p>
             <a:pPr lvl="3"/>
             <a:r>
-              <a:rPr lang="ko-KR" altLang="en-US" smtClean="0"/>
+              <a:rPr lang="ko-KR" altLang="en-US"/>
               <a:t>넷째 수준</a:t>
             </a:r>
           </a:p>
           <a:p>
             <a:pPr lvl="4"/>
             <a:r>
-              <a:rPr lang="ko-KR" altLang="en-US" smtClean="0"/>
+              <a:rPr lang="ko-KR" altLang="en-US"/>
               <a:t>다섯째 수준</a:t>
             </a:r>
-            <a:endParaRPr lang="ko-KR" altLang="en-US"/>
           </a:p>
         </p:txBody>
       </p:sp>
@@ -793,7 +801,7 @@
           <a:p>
             <a:fld id="{FB30EDBD-1C2D-4C1E-B459-B60219FAB484}" type="datetimeFigureOut">
               <a:rPr lang="ko-KR" altLang="en-US" smtClean="0"/>
-              <a:t>2020-09-02</a:t>
+              <a:t>2020-09-03</a:t>
             </a:fld>
             <a:endParaRPr lang="ko-KR" altLang="en-US"/>
           </a:p>
@@ -891,10 +899,9 @@
           </a:lstStyle>
           <a:p>
             <a:r>
-              <a:rPr lang="ko-KR" altLang="en-US" smtClean="0"/>
+              <a:rPr lang="ko-KR" altLang="en-US"/>
               <a:t>마스터 제목 스타일 편집</a:t>
             </a:r>
-            <a:endParaRPr lang="ko-KR" altLang="en-US"/>
           </a:p>
         </p:txBody>
       </p:sp>
@@ -1011,7 +1018,7 @@
           <a:p>
             <a:pPr lvl="0"/>
             <a:r>
-              <a:rPr lang="ko-KR" altLang="en-US" smtClean="0"/>
+              <a:rPr lang="ko-KR" altLang="en-US"/>
               <a:t>마스터 텍스트 스타일을 편집합니다</a:t>
             </a:r>
           </a:p>
@@ -1034,7 +1041,7 @@
           <a:p>
             <a:fld id="{FB30EDBD-1C2D-4C1E-B459-B60219FAB484}" type="datetimeFigureOut">
               <a:rPr lang="ko-KR" altLang="en-US" smtClean="0"/>
-              <a:t>2020-09-02</a:t>
+              <a:t>2020-09-03</a:t>
             </a:fld>
             <a:endParaRPr lang="ko-KR" altLang="en-US"/>
           </a:p>
@@ -1123,10 +1130,9 @@
           <a:lstStyle/>
           <a:p>
             <a:r>
-              <a:rPr lang="ko-KR" altLang="en-US" smtClean="0"/>
+              <a:rPr lang="ko-KR" altLang="en-US"/>
               <a:t>마스터 제목 스타일 편집</a:t>
             </a:r>
-            <a:endParaRPr lang="ko-KR" altLang="en-US"/>
           </a:p>
         </p:txBody>
       </p:sp>
@@ -1180,38 +1186,37 @@
           <a:p>
             <a:pPr lvl="0"/>
             <a:r>
-              <a:rPr lang="ko-KR" altLang="en-US" smtClean="0"/>
+              <a:rPr lang="ko-KR" altLang="en-US"/>
               <a:t>마스터 텍스트 스타일을 편집합니다</a:t>
             </a:r>
           </a:p>
           <a:p>
             <a:pPr lvl="1"/>
             <a:r>
-              <a:rPr lang="ko-KR" altLang="en-US" smtClean="0"/>
+              <a:rPr lang="ko-KR" altLang="en-US"/>
               <a:t>둘째 수준</a:t>
             </a:r>
           </a:p>
           <a:p>
             <a:pPr lvl="2"/>
             <a:r>
-              <a:rPr lang="ko-KR" altLang="en-US" smtClean="0"/>
+              <a:rPr lang="ko-KR" altLang="en-US"/>
               <a:t>셋째 수준</a:t>
             </a:r>
           </a:p>
           <a:p>
             <a:pPr lvl="3"/>
             <a:r>
-              <a:rPr lang="ko-KR" altLang="en-US" smtClean="0"/>
+              <a:rPr lang="ko-KR" altLang="en-US"/>
               <a:t>넷째 수준</a:t>
             </a:r>
           </a:p>
           <a:p>
             <a:pPr lvl="4"/>
             <a:r>
-              <a:rPr lang="ko-KR" altLang="en-US" smtClean="0"/>
+              <a:rPr lang="ko-KR" altLang="en-US"/>
               <a:t>다섯째 수준</a:t>
             </a:r>
-            <a:endParaRPr lang="ko-KR" altLang="en-US"/>
           </a:p>
         </p:txBody>
       </p:sp>
@@ -1265,38 +1270,37 @@
           <a:p>
             <a:pPr lvl="0"/>
             <a:r>
-              <a:rPr lang="ko-KR" altLang="en-US" smtClean="0"/>
+              <a:rPr lang="ko-KR" altLang="en-US"/>
               <a:t>마스터 텍스트 스타일을 편집합니다</a:t>
             </a:r>
           </a:p>
           <a:p>
             <a:pPr lvl="1"/>
             <a:r>
-              <a:rPr lang="ko-KR" altLang="en-US" smtClean="0"/>
+              <a:rPr lang="ko-KR" altLang="en-US"/>
               <a:t>둘째 수준</a:t>
             </a:r>
           </a:p>
           <a:p>
             <a:pPr lvl="2"/>
             <a:r>
-              <a:rPr lang="ko-KR" altLang="en-US" smtClean="0"/>
+              <a:rPr lang="ko-KR" altLang="en-US"/>
               <a:t>셋째 수준</a:t>
             </a:r>
           </a:p>
           <a:p>
             <a:pPr lvl="3"/>
             <a:r>
-              <a:rPr lang="ko-KR" altLang="en-US" smtClean="0"/>
+              <a:rPr lang="ko-KR" altLang="en-US"/>
               <a:t>넷째 수준</a:t>
             </a:r>
           </a:p>
           <a:p>
             <a:pPr lvl="4"/>
             <a:r>
-              <a:rPr lang="ko-KR" altLang="en-US" smtClean="0"/>
+              <a:rPr lang="ko-KR" altLang="en-US"/>
               <a:t>다섯째 수준</a:t>
             </a:r>
-            <a:endParaRPr lang="ko-KR" altLang="en-US"/>
           </a:p>
         </p:txBody>
       </p:sp>
@@ -1317,7 +1321,7 @@
           <a:p>
             <a:fld id="{FB30EDBD-1C2D-4C1E-B459-B60219FAB484}" type="datetimeFigureOut">
               <a:rPr lang="ko-KR" altLang="en-US" smtClean="0"/>
-              <a:t>2020-09-02</a:t>
+              <a:t>2020-09-03</a:t>
             </a:fld>
             <a:endParaRPr lang="ko-KR" altLang="en-US"/>
           </a:p>
@@ -1410,10 +1414,9 @@
           </a:lstStyle>
           <a:p>
             <a:r>
-              <a:rPr lang="ko-KR" altLang="en-US" smtClean="0"/>
+              <a:rPr lang="ko-KR" altLang="en-US"/>
               <a:t>마스터 제목 스타일 편집</a:t>
             </a:r>
-            <a:endParaRPr lang="ko-KR" altLang="en-US"/>
           </a:p>
         </p:txBody>
       </p:sp>
@@ -1476,7 +1479,7 @@
           <a:p>
             <a:pPr lvl="0"/>
             <a:r>
-              <a:rPr lang="ko-KR" altLang="en-US" smtClean="0"/>
+              <a:rPr lang="ko-KR" altLang="en-US"/>
               <a:t>마스터 텍스트 스타일을 편집합니다</a:t>
             </a:r>
           </a:p>
@@ -1532,38 +1535,37 @@
           <a:p>
             <a:pPr lvl="0"/>
             <a:r>
-              <a:rPr lang="ko-KR" altLang="en-US" smtClean="0"/>
+              <a:rPr lang="ko-KR" altLang="en-US"/>
               <a:t>마스터 텍스트 스타일을 편집합니다</a:t>
             </a:r>
           </a:p>
           <a:p>
             <a:pPr lvl="1"/>
             <a:r>
-              <a:rPr lang="ko-KR" altLang="en-US" smtClean="0"/>
+              <a:rPr lang="ko-KR" altLang="en-US"/>
               <a:t>둘째 수준</a:t>
             </a:r>
           </a:p>
           <a:p>
             <a:pPr lvl="2"/>
             <a:r>
-              <a:rPr lang="ko-KR" altLang="en-US" smtClean="0"/>
+              <a:rPr lang="ko-KR" altLang="en-US"/>
               <a:t>셋째 수준</a:t>
             </a:r>
           </a:p>
           <a:p>
             <a:pPr lvl="3"/>
             <a:r>
-              <a:rPr lang="ko-KR" altLang="en-US" smtClean="0"/>
+              <a:rPr lang="ko-KR" altLang="en-US"/>
               <a:t>넷째 수준</a:t>
             </a:r>
           </a:p>
           <a:p>
             <a:pPr lvl="4"/>
             <a:r>
-              <a:rPr lang="ko-KR" altLang="en-US" smtClean="0"/>
+              <a:rPr lang="ko-KR" altLang="en-US"/>
               <a:t>다섯째 수준</a:t>
             </a:r>
-            <a:endParaRPr lang="ko-KR" altLang="en-US"/>
           </a:p>
         </p:txBody>
       </p:sp>
@@ -1626,7 +1628,7 @@
           <a:p>
             <a:pPr lvl="0"/>
             <a:r>
-              <a:rPr lang="ko-KR" altLang="en-US" smtClean="0"/>
+              <a:rPr lang="ko-KR" altLang="en-US"/>
               <a:t>마스터 텍스트 스타일을 편집합니다</a:t>
             </a:r>
           </a:p>
@@ -1682,38 +1684,37 @@
           <a:p>
             <a:pPr lvl="0"/>
             <a:r>
-              <a:rPr lang="ko-KR" altLang="en-US" smtClean="0"/>
+              <a:rPr lang="ko-KR" altLang="en-US"/>
               <a:t>마스터 텍스트 스타일을 편집합니다</a:t>
             </a:r>
           </a:p>
           <a:p>
             <a:pPr lvl="1"/>
             <a:r>
-              <a:rPr lang="ko-KR" altLang="en-US" smtClean="0"/>
+              <a:rPr lang="ko-KR" altLang="en-US"/>
               <a:t>둘째 수준</a:t>
             </a:r>
           </a:p>
           <a:p>
             <a:pPr lvl="2"/>
             <a:r>
-              <a:rPr lang="ko-KR" altLang="en-US" smtClean="0"/>
+              <a:rPr lang="ko-KR" altLang="en-US"/>
               <a:t>셋째 수준</a:t>
             </a:r>
           </a:p>
           <a:p>
             <a:pPr lvl="3"/>
             <a:r>
-              <a:rPr lang="ko-KR" altLang="en-US" smtClean="0"/>
+              <a:rPr lang="ko-KR" altLang="en-US"/>
               <a:t>넷째 수준</a:t>
             </a:r>
           </a:p>
           <a:p>
             <a:pPr lvl="4"/>
             <a:r>
-              <a:rPr lang="ko-KR" altLang="en-US" smtClean="0"/>
+              <a:rPr lang="ko-KR" altLang="en-US"/>
               <a:t>다섯째 수준</a:t>
             </a:r>
-            <a:endParaRPr lang="ko-KR" altLang="en-US"/>
           </a:p>
         </p:txBody>
       </p:sp>
@@ -1734,7 +1735,7 @@
           <a:p>
             <a:fld id="{FB30EDBD-1C2D-4C1E-B459-B60219FAB484}" type="datetimeFigureOut">
               <a:rPr lang="ko-KR" altLang="en-US" smtClean="0"/>
-              <a:t>2020-09-02</a:t>
+              <a:t>2020-09-03</a:t>
             </a:fld>
             <a:endParaRPr lang="ko-KR" altLang="en-US"/>
           </a:p>
@@ -1823,10 +1824,9 @@
           <a:lstStyle/>
           <a:p>
             <a:r>
-              <a:rPr lang="ko-KR" altLang="en-US" smtClean="0"/>
+              <a:rPr lang="ko-KR" altLang="en-US"/>
               <a:t>마스터 제목 스타일 편집</a:t>
             </a:r>
-            <a:endParaRPr lang="ko-KR" altLang="en-US"/>
           </a:p>
         </p:txBody>
       </p:sp>
@@ -1847,7 +1847,7 @@
           <a:p>
             <a:fld id="{FB30EDBD-1C2D-4C1E-B459-B60219FAB484}" type="datetimeFigureOut">
               <a:rPr lang="ko-KR" altLang="en-US" smtClean="0"/>
-              <a:t>2020-09-02</a:t>
+              <a:t>2020-09-03</a:t>
             </a:fld>
             <a:endParaRPr lang="ko-KR" altLang="en-US"/>
           </a:p>
@@ -1937,7 +1937,7 @@
           <a:p>
             <a:fld id="{FB30EDBD-1C2D-4C1E-B459-B60219FAB484}" type="datetimeFigureOut">
               <a:rPr lang="ko-KR" altLang="en-US" smtClean="0"/>
-              <a:t>2020-09-02</a:t>
+              <a:t>2020-09-03</a:t>
             </a:fld>
             <a:endParaRPr lang="ko-KR" altLang="en-US"/>
           </a:p>
@@ -2035,10 +2035,9 @@
           </a:lstStyle>
           <a:p>
             <a:r>
-              <a:rPr lang="ko-KR" altLang="en-US" smtClean="0"/>
+              <a:rPr lang="ko-KR" altLang="en-US"/>
               <a:t>마스터 제목 스타일 편집</a:t>
             </a:r>
-            <a:endParaRPr lang="ko-KR" altLang="en-US"/>
           </a:p>
         </p:txBody>
       </p:sp>
@@ -2092,38 +2091,37 @@
           <a:p>
             <a:pPr lvl="0"/>
             <a:r>
-              <a:rPr lang="ko-KR" altLang="en-US" smtClean="0"/>
+              <a:rPr lang="ko-KR" altLang="en-US"/>
               <a:t>마스터 텍스트 스타일을 편집합니다</a:t>
             </a:r>
           </a:p>
           <a:p>
             <a:pPr lvl="1"/>
             <a:r>
-              <a:rPr lang="ko-KR" altLang="en-US" smtClean="0"/>
+              <a:rPr lang="ko-KR" altLang="en-US"/>
               <a:t>둘째 수준</a:t>
             </a:r>
           </a:p>
           <a:p>
             <a:pPr lvl="2"/>
             <a:r>
-              <a:rPr lang="ko-KR" altLang="en-US" smtClean="0"/>
+              <a:rPr lang="ko-KR" altLang="en-US"/>
               <a:t>셋째 수준</a:t>
             </a:r>
           </a:p>
           <a:p>
             <a:pPr lvl="3"/>
             <a:r>
-              <a:rPr lang="ko-KR" altLang="en-US" smtClean="0"/>
+              <a:rPr lang="ko-KR" altLang="en-US"/>
               <a:t>넷째 수준</a:t>
             </a:r>
           </a:p>
           <a:p>
             <a:pPr lvl="4"/>
             <a:r>
-              <a:rPr lang="ko-KR" altLang="en-US" smtClean="0"/>
+              <a:rPr lang="ko-KR" altLang="en-US"/>
               <a:t>다섯째 수준</a:t>
             </a:r>
-            <a:endParaRPr lang="ko-KR" altLang="en-US"/>
           </a:p>
         </p:txBody>
       </p:sp>
@@ -2186,7 +2184,7 @@
           <a:p>
             <a:pPr lvl="0"/>
             <a:r>
-              <a:rPr lang="ko-KR" altLang="en-US" smtClean="0"/>
+              <a:rPr lang="ko-KR" altLang="en-US"/>
               <a:t>마스터 텍스트 스타일을 편집합니다</a:t>
             </a:r>
           </a:p>
@@ -2209,7 +2207,7 @@
           <a:p>
             <a:fld id="{FB30EDBD-1C2D-4C1E-B459-B60219FAB484}" type="datetimeFigureOut">
               <a:rPr lang="ko-KR" altLang="en-US" smtClean="0"/>
-              <a:t>2020-09-02</a:t>
+              <a:t>2020-09-03</a:t>
             </a:fld>
             <a:endParaRPr lang="ko-KR" altLang="en-US"/>
           </a:p>
@@ -2307,10 +2305,9 @@
           </a:lstStyle>
           <a:p>
             <a:r>
-              <a:rPr lang="ko-KR" altLang="en-US" smtClean="0"/>
+              <a:rPr lang="ko-KR" altLang="en-US"/>
               <a:t>마스터 제목 스타일 편집</a:t>
             </a:r>
-            <a:endParaRPr lang="ko-KR" altLang="en-US"/>
           </a:p>
         </p:txBody>
       </p:sp>
@@ -2434,7 +2431,7 @@
           <a:p>
             <a:pPr lvl="0"/>
             <a:r>
-              <a:rPr lang="ko-KR" altLang="en-US" smtClean="0"/>
+              <a:rPr lang="ko-KR" altLang="en-US"/>
               <a:t>마스터 텍스트 스타일을 편집합니다</a:t>
             </a:r>
           </a:p>
@@ -2457,7 +2454,7 @@
           <a:p>
             <a:fld id="{FB30EDBD-1C2D-4C1E-B459-B60219FAB484}" type="datetimeFigureOut">
               <a:rPr lang="ko-KR" altLang="en-US" smtClean="0"/>
-              <a:t>2020-09-02</a:t>
+              <a:t>2020-09-03</a:t>
             </a:fld>
             <a:endParaRPr lang="ko-KR" altLang="en-US"/>
           </a:p>
@@ -2561,10 +2558,9 @@
           <a:lstStyle/>
           <a:p>
             <a:r>
-              <a:rPr lang="ko-KR" altLang="en-US" smtClean="0"/>
+              <a:rPr lang="ko-KR" altLang="en-US"/>
               <a:t>마스터 제목 스타일 편집</a:t>
             </a:r>
-            <a:endParaRPr lang="ko-KR" altLang="en-US"/>
           </a:p>
         </p:txBody>
       </p:sp>
@@ -2595,38 +2591,37 @@
           <a:p>
             <a:pPr lvl="0"/>
             <a:r>
-              <a:rPr lang="ko-KR" altLang="en-US" smtClean="0"/>
+              <a:rPr lang="ko-KR" altLang="en-US"/>
               <a:t>마스터 텍스트 스타일을 편집합니다</a:t>
             </a:r>
           </a:p>
           <a:p>
             <a:pPr lvl="1"/>
             <a:r>
-              <a:rPr lang="ko-KR" altLang="en-US" smtClean="0"/>
+              <a:rPr lang="ko-KR" altLang="en-US"/>
               <a:t>둘째 수준</a:t>
             </a:r>
           </a:p>
           <a:p>
             <a:pPr lvl="2"/>
             <a:r>
-              <a:rPr lang="ko-KR" altLang="en-US" smtClean="0"/>
+              <a:rPr lang="ko-KR" altLang="en-US"/>
               <a:t>셋째 수준</a:t>
             </a:r>
           </a:p>
           <a:p>
             <a:pPr lvl="3"/>
             <a:r>
-              <a:rPr lang="ko-KR" altLang="en-US" smtClean="0"/>
+              <a:rPr lang="ko-KR" altLang="en-US"/>
               <a:t>넷째 수준</a:t>
             </a:r>
           </a:p>
           <a:p>
             <a:pPr lvl="4"/>
             <a:r>
-              <a:rPr lang="ko-KR" altLang="en-US" smtClean="0"/>
+              <a:rPr lang="ko-KR" altLang="en-US"/>
               <a:t>다섯째 수준</a:t>
             </a:r>
-            <a:endParaRPr lang="ko-KR" altLang="en-US"/>
           </a:p>
         </p:txBody>
       </p:sp>
@@ -2665,7 +2660,7 @@
           <a:p>
             <a:fld id="{FB30EDBD-1C2D-4C1E-B459-B60219FAB484}" type="datetimeFigureOut">
               <a:rPr lang="ko-KR" altLang="en-US" smtClean="0"/>
-              <a:t>2020-09-02</a:t>
+              <a:t>2020-09-03</a:t>
             </a:fld>
             <a:endParaRPr lang="ko-KR" altLang="en-US"/>
           </a:p>
@@ -3175,13 +3170,15 @@
       <p:cxnSp>
         <p:nvCxnSpPr>
           <p:cNvPr id="13" name="직선 화살표 연결선 12"/>
-          <p:cNvCxnSpPr/>
+          <p:cNvCxnSpPr>
+            <a:cxnSpLocks/>
+          </p:cNvCxnSpPr>
           <p:nvPr/>
         </p:nvCxnSpPr>
         <p:spPr>
-          <a:xfrm flipV="1">
-            <a:off x="3563888" y="2708920"/>
-            <a:ext cx="792088" cy="1440160"/>
+          <a:xfrm flipH="1" flipV="1">
+            <a:off x="3439662" y="3429000"/>
+            <a:ext cx="124227" cy="720080"/>
           </a:xfrm>
           <a:prstGeom prst="straightConnector1">
             <a:avLst/>
@@ -3294,11 +3291,13 @@
           <a:prstGeom prst="line">
             <a:avLst/>
           </a:prstGeom>
-          <a:ln>
+          <a:ln w="19050">
             <a:solidFill>
               <a:schemeClr val="tx1"/>
             </a:solidFill>
-            <a:prstDash val="lgDash"/>
+            <a:prstDash val="solid"/>
+            <a:headEnd type="arrow" w="med" len="med"/>
+            <a:tailEnd type="none" w="med" len="med"/>
           </a:ln>
         </p:spPr>
         <p:style>
@@ -3396,7 +3395,7 @@
         </p:nvSpPr>
         <p:spPr>
           <a:xfrm>
-            <a:off x="5724128" y="2708920"/>
+            <a:off x="5652326" y="2699628"/>
             <a:ext cx="867545" cy="369332"/>
           </a:xfrm>
           <a:prstGeom prst="rect">
@@ -3411,13 +3410,754 @@
           <a:lstStyle/>
           <a:p>
             <a:r>
-              <a:rPr lang="en-US" altLang="ko-KR" b="1" dirty="0" smtClean="0"/>
+              <a:rPr lang="en-US" altLang="ko-KR" b="1" dirty="0"/>
               <a:t>Col(A)</a:t>
             </a:r>
             <a:endParaRPr lang="ko-KR" altLang="en-US" b="1" dirty="0"/>
           </a:p>
         </p:txBody>
       </p:sp>
+      <mc:AlternateContent xmlns:mc="http://schemas.openxmlformats.org/markup-compatibility/2006">
+        <mc:Choice xmlns:a14="http://schemas.microsoft.com/office/drawing/2010/main" Requires="a14">
+          <p:sp>
+            <p:nvSpPr>
+              <p:cNvPr id="2" name="TextBox 1">
+                <a:extLst>
+                  <a:ext uri="{FF2B5EF4-FFF2-40B4-BE49-F238E27FC236}">
+                    <a16:creationId xmlns:a16="http://schemas.microsoft.com/office/drawing/2014/main" id="{DAC7E6F0-9276-4F03-9EE2-565FA8BBCE3F}"/>
+                  </a:ext>
+                </a:extLst>
+              </p:cNvPr>
+              <p:cNvSpPr txBox="1"/>
+              <p:nvPr/>
+            </p:nvSpPr>
+            <p:spPr>
+              <a:xfrm>
+                <a:off x="5155446" y="3745674"/>
+                <a:ext cx="496674" cy="369332"/>
+              </a:xfrm>
+              <a:prstGeom prst="rect">
+                <a:avLst/>
+              </a:prstGeom>
+              <a:noFill/>
+            </p:spPr>
+            <p:txBody>
+              <a:bodyPr wrap="none" rtlCol="0">
+                <a:spAutoFit/>
+              </a:bodyPr>
+              <a:lstStyle/>
+              <a:p>
+                <a14:m>
+                  <m:oMathPara xmlns:m="http://schemas.openxmlformats.org/officeDocument/2006/math">
+                    <m:oMathParaPr>
+                      <m:jc m:val="centerGroup"/>
+                    </m:oMathParaPr>
+                    <m:oMath xmlns:m="http://schemas.openxmlformats.org/officeDocument/2006/math">
+                      <m:sSub>
+                        <m:sSubPr>
+                          <m:ctrlPr>
+                            <a:rPr lang="en-US" altLang="ko-KR" b="0" i="1" smtClean="0">
+                              <a:latin typeface="Cambria Math" panose="02040503050406030204" pitchFamily="18" charset="0"/>
+                            </a:rPr>
+                          </m:ctrlPr>
+                        </m:sSubPr>
+                        <m:e>
+                          <m:acc>
+                            <m:accPr>
+                              <m:chr m:val="⃗"/>
+                              <m:ctrlPr>
+                                <a:rPr lang="en-US" altLang="ko-KR" b="0" i="1" smtClean="0">
+                                  <a:latin typeface="Cambria Math" panose="02040503050406030204" pitchFamily="18" charset="0"/>
+                                </a:rPr>
+                              </m:ctrlPr>
+                            </m:accPr>
+                            <m:e>
+                              <m:r>
+                                <a:rPr lang="en-US" altLang="ko-KR" b="0" i="1" smtClean="0">
+                                  <a:latin typeface="Cambria Math" panose="02040503050406030204" pitchFamily="18" charset="0"/>
+                                </a:rPr>
+                                <m:t>𝑎</m:t>
+                              </m:r>
+                            </m:e>
+                          </m:acc>
+                        </m:e>
+                        <m:sub>
+                          <m:r>
+                            <a:rPr lang="en-US" altLang="ko-KR" b="0" i="1" smtClean="0">
+                              <a:latin typeface="Cambria Math" panose="02040503050406030204" pitchFamily="18" charset="0"/>
+                            </a:rPr>
+                            <m:t>1</m:t>
+                          </m:r>
+                        </m:sub>
+                      </m:sSub>
+                    </m:oMath>
+                  </m:oMathPara>
+                </a14:m>
+                <a:endParaRPr lang="ko-KR" altLang="en-US" dirty="0"/>
+              </a:p>
+            </p:txBody>
+          </p:sp>
+        </mc:Choice>
+        <mc:Fallback>
+          <p:sp>
+            <p:nvSpPr>
+              <p:cNvPr id="2" name="TextBox 1">
+                <a:extLst>
+                  <a:ext uri="{FF2B5EF4-FFF2-40B4-BE49-F238E27FC236}">
+                    <a16:creationId xmlns:a16="http://schemas.microsoft.com/office/drawing/2014/main" id="{DAC7E6F0-9276-4F03-9EE2-565FA8BBCE3F}"/>
+                  </a:ext>
+                </a:extLst>
+              </p:cNvPr>
+              <p:cNvSpPr txBox="1">
+                <a:spLocks noRot="1" noChangeAspect="1" noMove="1" noResize="1" noEditPoints="1" noAdjustHandles="1" noChangeArrowheads="1" noChangeShapeType="1" noTextEdit="1"/>
+              </p:cNvSpPr>
+              <p:nvPr/>
+            </p:nvSpPr>
+            <p:spPr>
+              <a:xfrm>
+                <a:off x="5155446" y="3745674"/>
+                <a:ext cx="496674" cy="369332"/>
+              </a:xfrm>
+              <a:prstGeom prst="rect">
+                <a:avLst/>
+              </a:prstGeom>
+              <a:blipFill>
+                <a:blip r:embed="rId2"/>
+                <a:stretch>
+                  <a:fillRect t="-19672" r="-22222" b="-1639"/>
+                </a:stretch>
+              </a:blipFill>
+            </p:spPr>
+            <p:txBody>
+              <a:bodyPr/>
+              <a:lstStyle/>
+              <a:p>
+                <a:r>
+                  <a:rPr lang="ko-KR" altLang="en-US">
+                    <a:noFill/>
+                  </a:rPr>
+                  <a:t> </a:t>
+                </a:r>
+              </a:p>
+            </p:txBody>
+          </p:sp>
+        </mc:Fallback>
+      </mc:AlternateContent>
+      <mc:AlternateContent xmlns:mc="http://schemas.openxmlformats.org/markup-compatibility/2006">
+        <mc:Choice xmlns:a14="http://schemas.microsoft.com/office/drawing/2010/main" Requires="a14">
+          <p:sp>
+            <p:nvSpPr>
+              <p:cNvPr id="12" name="TextBox 11">
+                <a:extLst>
+                  <a:ext uri="{FF2B5EF4-FFF2-40B4-BE49-F238E27FC236}">
+                    <a16:creationId xmlns:a16="http://schemas.microsoft.com/office/drawing/2014/main" id="{83EA6CDE-D8B1-4CB8-A3DA-AAB3CDBF821A}"/>
+                  </a:ext>
+                </a:extLst>
+              </p:cNvPr>
+              <p:cNvSpPr txBox="1"/>
+              <p:nvPr/>
+            </p:nvSpPr>
+            <p:spPr>
+              <a:xfrm>
+                <a:off x="3043341" y="3486284"/>
+                <a:ext cx="501996" cy="369332"/>
+              </a:xfrm>
+              <a:prstGeom prst="rect">
+                <a:avLst/>
+              </a:prstGeom>
+              <a:noFill/>
+            </p:spPr>
+            <p:txBody>
+              <a:bodyPr wrap="none" rtlCol="0">
+                <a:spAutoFit/>
+              </a:bodyPr>
+              <a:lstStyle/>
+              <a:p>
+                <a14:m>
+                  <m:oMathPara xmlns:m="http://schemas.openxmlformats.org/officeDocument/2006/math">
+                    <m:oMathParaPr>
+                      <m:jc m:val="centerGroup"/>
+                    </m:oMathParaPr>
+                    <m:oMath xmlns:m="http://schemas.openxmlformats.org/officeDocument/2006/math">
+                      <m:sSub>
+                        <m:sSubPr>
+                          <m:ctrlPr>
+                            <a:rPr lang="en-US" altLang="ko-KR" b="0" i="1" smtClean="0">
+                              <a:latin typeface="Cambria Math" panose="02040503050406030204" pitchFamily="18" charset="0"/>
+                            </a:rPr>
+                          </m:ctrlPr>
+                        </m:sSubPr>
+                        <m:e>
+                          <m:acc>
+                            <m:accPr>
+                              <m:chr m:val="⃗"/>
+                              <m:ctrlPr>
+                                <a:rPr lang="en-US" altLang="ko-KR" b="0" i="1" smtClean="0">
+                                  <a:latin typeface="Cambria Math" panose="02040503050406030204" pitchFamily="18" charset="0"/>
+                                </a:rPr>
+                              </m:ctrlPr>
+                            </m:accPr>
+                            <m:e>
+                              <m:r>
+                                <a:rPr lang="en-US" altLang="ko-KR" b="0" i="1" smtClean="0">
+                                  <a:latin typeface="Cambria Math" panose="02040503050406030204" pitchFamily="18" charset="0"/>
+                                </a:rPr>
+                                <m:t>𝑎</m:t>
+                              </m:r>
+                            </m:e>
+                          </m:acc>
+                        </m:e>
+                        <m:sub>
+                          <m:r>
+                            <a:rPr lang="en-US" altLang="ko-KR" b="0" i="1" smtClean="0">
+                              <a:latin typeface="Cambria Math" panose="02040503050406030204" pitchFamily="18" charset="0"/>
+                            </a:rPr>
+                            <m:t>2</m:t>
+                          </m:r>
+                        </m:sub>
+                      </m:sSub>
+                    </m:oMath>
+                  </m:oMathPara>
+                </a14:m>
+                <a:endParaRPr lang="ko-KR" altLang="en-US" dirty="0"/>
+              </a:p>
+            </p:txBody>
+          </p:sp>
+        </mc:Choice>
+        <mc:Fallback>
+          <p:sp>
+            <p:nvSpPr>
+              <p:cNvPr id="12" name="TextBox 11">
+                <a:extLst>
+                  <a:ext uri="{FF2B5EF4-FFF2-40B4-BE49-F238E27FC236}">
+                    <a16:creationId xmlns:a16="http://schemas.microsoft.com/office/drawing/2014/main" id="{83EA6CDE-D8B1-4CB8-A3DA-AAB3CDBF821A}"/>
+                  </a:ext>
+                </a:extLst>
+              </p:cNvPr>
+              <p:cNvSpPr txBox="1">
+                <a:spLocks noRot="1" noChangeAspect="1" noMove="1" noResize="1" noEditPoints="1" noAdjustHandles="1" noChangeArrowheads="1" noChangeShapeType="1" noTextEdit="1"/>
+              </p:cNvSpPr>
+              <p:nvPr/>
+            </p:nvSpPr>
+            <p:spPr>
+              <a:xfrm>
+                <a:off x="3043341" y="3486284"/>
+                <a:ext cx="501996" cy="369332"/>
+              </a:xfrm>
+              <a:prstGeom prst="rect">
+                <a:avLst/>
+              </a:prstGeom>
+              <a:blipFill>
+                <a:blip r:embed="rId3"/>
+                <a:stretch>
+                  <a:fillRect t="-20000" r="-21687" b="-3333"/>
+                </a:stretch>
+              </a:blipFill>
+            </p:spPr>
+            <p:txBody>
+              <a:bodyPr/>
+              <a:lstStyle/>
+              <a:p>
+                <a:r>
+                  <a:rPr lang="ko-KR" altLang="en-US">
+                    <a:noFill/>
+                  </a:rPr>
+                  <a:t> </a:t>
+                </a:r>
+              </a:p>
+            </p:txBody>
+          </p:sp>
+        </mc:Fallback>
+      </mc:AlternateContent>
+      <mc:AlternateContent xmlns:mc="http://schemas.openxmlformats.org/markup-compatibility/2006">
+        <mc:Choice xmlns:a14="http://schemas.microsoft.com/office/drawing/2010/main" Requires="a14">
+          <p:sp>
+            <p:nvSpPr>
+              <p:cNvPr id="15" name="TextBox 14">
+                <a:extLst>
+                  <a:ext uri="{FF2B5EF4-FFF2-40B4-BE49-F238E27FC236}">
+                    <a16:creationId xmlns:a16="http://schemas.microsoft.com/office/drawing/2014/main" id="{9E686680-3D0D-4145-81F8-AF3A457B1DEF}"/>
+                  </a:ext>
+                </a:extLst>
+              </p:cNvPr>
+              <p:cNvSpPr txBox="1"/>
+              <p:nvPr/>
+            </p:nvSpPr>
+            <p:spPr>
+              <a:xfrm>
+                <a:off x="3851573" y="1576499"/>
+                <a:ext cx="396519" cy="410305"/>
+              </a:xfrm>
+              <a:prstGeom prst="rect">
+                <a:avLst/>
+              </a:prstGeom>
+              <a:noFill/>
+            </p:spPr>
+            <p:txBody>
+              <a:bodyPr wrap="none" rtlCol="0">
+                <a:spAutoFit/>
+              </a:bodyPr>
+              <a:lstStyle/>
+              <a:p>
+                <a14:m>
+                  <m:oMathPara xmlns:m="http://schemas.openxmlformats.org/officeDocument/2006/math">
+                    <m:oMathParaPr>
+                      <m:jc m:val="centerGroup"/>
+                    </m:oMathParaPr>
+                    <m:oMath xmlns:m="http://schemas.openxmlformats.org/officeDocument/2006/math">
+                      <m:acc>
+                        <m:accPr>
+                          <m:chr m:val="⃗"/>
+                          <m:ctrlPr>
+                            <a:rPr lang="en-US" altLang="ko-KR" b="0" i="1" smtClean="0">
+                              <a:latin typeface="Cambria Math" panose="02040503050406030204" pitchFamily="18" charset="0"/>
+                            </a:rPr>
+                          </m:ctrlPr>
+                        </m:accPr>
+                        <m:e>
+                          <m:r>
+                            <a:rPr lang="en-US" altLang="ko-KR" b="0" i="1" smtClean="0">
+                              <a:latin typeface="Cambria Math" panose="02040503050406030204" pitchFamily="18" charset="0"/>
+                            </a:rPr>
+                            <m:t>𝑏</m:t>
+                          </m:r>
+                        </m:e>
+                      </m:acc>
+                    </m:oMath>
+                  </m:oMathPara>
+                </a14:m>
+                <a:endParaRPr lang="ko-KR" altLang="en-US" dirty="0"/>
+              </a:p>
+            </p:txBody>
+          </p:sp>
+        </mc:Choice>
+        <mc:Fallback>
+          <p:sp>
+            <p:nvSpPr>
+              <p:cNvPr id="15" name="TextBox 14">
+                <a:extLst>
+                  <a:ext uri="{FF2B5EF4-FFF2-40B4-BE49-F238E27FC236}">
+                    <a16:creationId xmlns:a16="http://schemas.microsoft.com/office/drawing/2014/main" id="{9E686680-3D0D-4145-81F8-AF3A457B1DEF}"/>
+                  </a:ext>
+                </a:extLst>
+              </p:cNvPr>
+              <p:cNvSpPr txBox="1">
+                <a:spLocks noRot="1" noChangeAspect="1" noMove="1" noResize="1" noEditPoints="1" noAdjustHandles="1" noChangeArrowheads="1" noChangeShapeType="1" noTextEdit="1"/>
+              </p:cNvSpPr>
+              <p:nvPr/>
+            </p:nvSpPr>
+            <p:spPr>
+              <a:xfrm>
+                <a:off x="3851573" y="1576499"/>
+                <a:ext cx="396519" cy="410305"/>
+              </a:xfrm>
+              <a:prstGeom prst="rect">
+                <a:avLst/>
+              </a:prstGeom>
+              <a:blipFill>
+                <a:blip r:embed="rId4"/>
+                <a:stretch>
+                  <a:fillRect/>
+                </a:stretch>
+              </a:blipFill>
+            </p:spPr>
+            <p:txBody>
+              <a:bodyPr/>
+              <a:lstStyle/>
+              <a:p>
+                <a:r>
+                  <a:rPr lang="ko-KR" altLang="en-US">
+                    <a:noFill/>
+                  </a:rPr>
+                  <a:t> </a:t>
+                </a:r>
+              </a:p>
+            </p:txBody>
+          </p:sp>
+        </mc:Fallback>
+      </mc:AlternateContent>
+      <mc:AlternateContent xmlns:mc="http://schemas.openxmlformats.org/markup-compatibility/2006">
+        <mc:Choice xmlns:a14="http://schemas.microsoft.com/office/drawing/2010/main" Requires="a14">
+          <p:sp>
+            <p:nvSpPr>
+              <p:cNvPr id="17" name="TextBox 16">
+                <a:extLst>
+                  <a:ext uri="{FF2B5EF4-FFF2-40B4-BE49-F238E27FC236}">
+                    <a16:creationId xmlns:a16="http://schemas.microsoft.com/office/drawing/2014/main" id="{E04FC533-E85C-4D00-8D86-E283FD3FD216}"/>
+                  </a:ext>
+                </a:extLst>
+              </p:cNvPr>
+              <p:cNvSpPr txBox="1"/>
+              <p:nvPr/>
+            </p:nvSpPr>
+            <p:spPr>
+              <a:xfrm>
+                <a:off x="4232074" y="3589149"/>
+                <a:ext cx="977382" cy="369332"/>
+              </a:xfrm>
+              <a:prstGeom prst="rect">
+                <a:avLst/>
+              </a:prstGeom>
+              <a:noFill/>
+            </p:spPr>
+            <p:txBody>
+              <a:bodyPr wrap="none" rtlCol="0">
+                <a:spAutoFit/>
+              </a:bodyPr>
+              <a:lstStyle/>
+              <a:p>
+                <a14:m>
+                  <m:oMathPara xmlns:m="http://schemas.openxmlformats.org/officeDocument/2006/math">
+                    <m:oMathParaPr>
+                      <m:jc m:val="centerGroup"/>
+                    </m:oMathParaPr>
+                    <m:oMath xmlns:m="http://schemas.openxmlformats.org/officeDocument/2006/math">
+                      <m:r>
+                        <a:rPr lang="en-US" altLang="ko-KR" b="0" i="1" smtClean="0">
+                          <a:latin typeface="Cambria Math" panose="02040503050406030204" pitchFamily="18" charset="0"/>
+                        </a:rPr>
+                        <m:t>𝑝</m:t>
+                      </m:r>
+                      <m:r>
+                        <a:rPr lang="en-US" altLang="ko-KR" b="0" i="1" smtClean="0">
+                          <a:latin typeface="Cambria Math" panose="02040503050406030204" pitchFamily="18" charset="0"/>
+                        </a:rPr>
+                        <m:t>=</m:t>
+                      </m:r>
+                      <m:r>
+                        <a:rPr lang="en-US" altLang="ko-KR" b="0" i="1" smtClean="0">
+                          <a:latin typeface="Cambria Math" panose="02040503050406030204" pitchFamily="18" charset="0"/>
+                        </a:rPr>
+                        <m:t>𝐴</m:t>
+                      </m:r>
+                      <m:acc>
+                        <m:accPr>
+                          <m:chr m:val="̂"/>
+                          <m:ctrlPr>
+                            <a:rPr lang="en-US" altLang="ko-KR" b="0" i="1" smtClean="0">
+                              <a:latin typeface="Cambria Math" panose="02040503050406030204" pitchFamily="18" charset="0"/>
+                            </a:rPr>
+                          </m:ctrlPr>
+                        </m:accPr>
+                        <m:e>
+                          <m:r>
+                            <a:rPr lang="en-US" altLang="ko-KR" b="0" i="1" smtClean="0">
+                              <a:latin typeface="Cambria Math" panose="02040503050406030204" pitchFamily="18" charset="0"/>
+                            </a:rPr>
+                            <m:t>𝑥</m:t>
+                          </m:r>
+                        </m:e>
+                      </m:acc>
+                    </m:oMath>
+                  </m:oMathPara>
+                </a14:m>
+                <a:endParaRPr lang="ko-KR" altLang="en-US" dirty="0"/>
+              </a:p>
+            </p:txBody>
+          </p:sp>
+        </mc:Choice>
+        <mc:Fallback>
+          <p:sp>
+            <p:nvSpPr>
+              <p:cNvPr id="17" name="TextBox 16">
+                <a:extLst>
+                  <a:ext uri="{FF2B5EF4-FFF2-40B4-BE49-F238E27FC236}">
+                    <a16:creationId xmlns:a16="http://schemas.microsoft.com/office/drawing/2014/main" id="{E04FC533-E85C-4D00-8D86-E283FD3FD216}"/>
+                  </a:ext>
+                </a:extLst>
+              </p:cNvPr>
+              <p:cNvSpPr txBox="1">
+                <a:spLocks noRot="1" noChangeAspect="1" noMove="1" noResize="1" noEditPoints="1" noAdjustHandles="1" noChangeArrowheads="1" noChangeShapeType="1" noTextEdit="1"/>
+              </p:cNvSpPr>
+              <p:nvPr/>
+            </p:nvSpPr>
+            <p:spPr>
+              <a:xfrm>
+                <a:off x="4232074" y="3589149"/>
+                <a:ext cx="977382" cy="369332"/>
+              </a:xfrm>
+              <a:prstGeom prst="rect">
+                <a:avLst/>
+              </a:prstGeom>
+              <a:blipFill>
+                <a:blip r:embed="rId5"/>
+                <a:stretch>
+                  <a:fillRect t="-3333" r="-24845" b="-10000"/>
+                </a:stretch>
+              </a:blipFill>
+            </p:spPr>
+            <p:txBody>
+              <a:bodyPr/>
+              <a:lstStyle/>
+              <a:p>
+                <a:r>
+                  <a:rPr lang="ko-KR" altLang="en-US">
+                    <a:noFill/>
+                  </a:rPr>
+                  <a:t> </a:t>
+                </a:r>
+              </a:p>
+            </p:txBody>
+          </p:sp>
+        </mc:Fallback>
+      </mc:AlternateContent>
+      <p:sp>
+        <p:nvSpPr>
+          <p:cNvPr id="3" name="자유형: 도형 2">
+            <a:extLst>
+              <a:ext uri="{FF2B5EF4-FFF2-40B4-BE49-F238E27FC236}">
+                <a16:creationId xmlns:a16="http://schemas.microsoft.com/office/drawing/2014/main" id="{2B505BF8-318C-498F-B4D1-D9C45876A24C}"/>
+              </a:ext>
+            </a:extLst>
+          </p:cNvPr>
+          <p:cNvSpPr/>
+          <p:nvPr/>
+        </p:nvSpPr>
+        <p:spPr>
+          <a:xfrm>
+            <a:off x="4232074" y="2210481"/>
+            <a:ext cx="923371" cy="961515"/>
+          </a:xfrm>
+          <a:custGeom>
+            <a:avLst/>
+            <a:gdLst>
+              <a:gd name="connsiteX0" fmla="*/ 647700 w 647700"/>
+              <a:gd name="connsiteY0" fmla="*/ 0 h 716280"/>
+              <a:gd name="connsiteX1" fmla="*/ 220980 w 647700"/>
+              <a:gd name="connsiteY1" fmla="*/ 327660 h 716280"/>
+              <a:gd name="connsiteX2" fmla="*/ 419100 w 647700"/>
+              <a:gd name="connsiteY2" fmla="*/ 487680 h 716280"/>
+              <a:gd name="connsiteX3" fmla="*/ 0 w 647700"/>
+              <a:gd name="connsiteY3" fmla="*/ 716280 h 716280"/>
+            </a:gdLst>
+            <a:ahLst/>
+            <a:cxnLst>
+              <a:cxn ang="0">
+                <a:pos x="connsiteX0" y="connsiteY0"/>
+              </a:cxn>
+              <a:cxn ang="0">
+                <a:pos x="connsiteX1" y="connsiteY1"/>
+              </a:cxn>
+              <a:cxn ang="0">
+                <a:pos x="connsiteX2" y="connsiteY2"/>
+              </a:cxn>
+              <a:cxn ang="0">
+                <a:pos x="connsiteX3" y="connsiteY3"/>
+              </a:cxn>
+            </a:cxnLst>
+            <a:rect l="l" t="t" r="r" b="b"/>
+            <a:pathLst>
+              <a:path w="647700" h="716280">
+                <a:moveTo>
+                  <a:pt x="647700" y="0"/>
+                </a:moveTo>
+                <a:cubicBezTo>
+                  <a:pt x="453390" y="123190"/>
+                  <a:pt x="259080" y="246380"/>
+                  <a:pt x="220980" y="327660"/>
+                </a:cubicBezTo>
+                <a:cubicBezTo>
+                  <a:pt x="182880" y="408940"/>
+                  <a:pt x="455930" y="422910"/>
+                  <a:pt x="419100" y="487680"/>
+                </a:cubicBezTo>
+                <a:cubicBezTo>
+                  <a:pt x="382270" y="552450"/>
+                  <a:pt x="191135" y="634365"/>
+                  <a:pt x="0" y="716280"/>
+                </a:cubicBezTo>
+              </a:path>
+            </a:pathLst>
+          </a:custGeom>
+          <a:noFill/>
+          <a:ln w="12700">
+            <a:solidFill>
+              <a:schemeClr val="tx1"/>
+            </a:solidFill>
+            <a:headEnd type="none" w="med" len="med"/>
+            <a:tailEnd type="arrow" w="med" len="med"/>
+          </a:ln>
+        </p:spPr>
+        <p:style>
+          <a:lnRef idx="2">
+            <a:schemeClr val="accent1">
+              <a:shade val="50000"/>
+            </a:schemeClr>
+          </a:lnRef>
+          <a:fillRef idx="1">
+            <a:schemeClr val="accent1"/>
+          </a:fillRef>
+          <a:effectRef idx="0">
+            <a:schemeClr val="accent1"/>
+          </a:effectRef>
+          <a:fontRef idx="minor">
+            <a:schemeClr val="lt1"/>
+          </a:fontRef>
+        </p:style>
+        <p:txBody>
+          <a:bodyPr rtlCol="0" anchor="ctr"/>
+          <a:lstStyle/>
+          <a:p>
+            <a:pPr algn="ctr"/>
+            <a:endParaRPr lang="ko-KR" altLang="en-US"/>
+          </a:p>
+        </p:txBody>
+      </p:sp>
+      <mc:AlternateContent xmlns:mc="http://schemas.openxmlformats.org/markup-compatibility/2006">
+        <mc:Choice xmlns:a14="http://schemas.microsoft.com/office/drawing/2010/main" Requires="a14">
+          <p:sp>
+            <p:nvSpPr>
+              <p:cNvPr id="18" name="TextBox 17">
+                <a:extLst>
+                  <a:ext uri="{FF2B5EF4-FFF2-40B4-BE49-F238E27FC236}">
+                    <a16:creationId xmlns:a16="http://schemas.microsoft.com/office/drawing/2014/main" id="{04D53F16-1B28-4E99-A385-214F85D9B350}"/>
+                  </a:ext>
+                </a:extLst>
+              </p:cNvPr>
+              <p:cNvSpPr txBox="1"/>
+              <p:nvPr/>
+            </p:nvSpPr>
+            <p:spPr>
+              <a:xfrm>
+                <a:off x="5155445" y="1869388"/>
+                <a:ext cx="1223540" cy="410305"/>
+              </a:xfrm>
+              <a:prstGeom prst="rect">
+                <a:avLst/>
+              </a:prstGeom>
+              <a:noFill/>
+            </p:spPr>
+            <p:txBody>
+              <a:bodyPr wrap="none" rtlCol="0">
+                <a:spAutoFit/>
+              </a:bodyPr>
+              <a:lstStyle/>
+              <a:p>
+                <a14:m>
+                  <m:oMathPara xmlns:m="http://schemas.openxmlformats.org/officeDocument/2006/math">
+                    <m:oMathParaPr>
+                      <m:jc m:val="centerGroup"/>
+                    </m:oMathParaPr>
+                    <m:oMath xmlns:m="http://schemas.openxmlformats.org/officeDocument/2006/math">
+                      <m:acc>
+                        <m:accPr>
+                          <m:chr m:val="⃗"/>
+                          <m:ctrlPr>
+                            <a:rPr lang="en-US" altLang="ko-KR" b="0" i="1" smtClean="0">
+                              <a:latin typeface="Cambria Math" panose="02040503050406030204" pitchFamily="18" charset="0"/>
+                            </a:rPr>
+                          </m:ctrlPr>
+                        </m:accPr>
+                        <m:e>
+                          <m:r>
+                            <a:rPr lang="en-US" altLang="ko-KR" b="0" i="1" smtClean="0">
+                              <a:latin typeface="Cambria Math" panose="02040503050406030204" pitchFamily="18" charset="0"/>
+                            </a:rPr>
+                            <m:t>𝑒</m:t>
+                          </m:r>
+                        </m:e>
+                      </m:acc>
+                      <m:r>
+                        <a:rPr lang="en-US" altLang="ko-KR" b="0" i="1" smtClean="0">
+                          <a:latin typeface="Cambria Math" panose="02040503050406030204" pitchFamily="18" charset="0"/>
+                        </a:rPr>
+                        <m:t>=</m:t>
+                      </m:r>
+                      <m:acc>
+                        <m:accPr>
+                          <m:chr m:val="⃗"/>
+                          <m:ctrlPr>
+                            <a:rPr lang="en-US" altLang="ko-KR" b="0" i="1" smtClean="0">
+                              <a:latin typeface="Cambria Math" panose="02040503050406030204" pitchFamily="18" charset="0"/>
+                            </a:rPr>
+                          </m:ctrlPr>
+                        </m:accPr>
+                        <m:e>
+                          <m:r>
+                            <a:rPr lang="en-US" altLang="ko-KR" b="0" i="1" smtClean="0">
+                              <a:latin typeface="Cambria Math" panose="02040503050406030204" pitchFamily="18" charset="0"/>
+                            </a:rPr>
+                            <m:t>𝑏</m:t>
+                          </m:r>
+                        </m:e>
+                      </m:acc>
+                      <m:r>
+                        <a:rPr lang="en-US" altLang="ko-KR" b="0" i="1" smtClean="0">
+                          <a:latin typeface="Cambria Math" panose="02040503050406030204" pitchFamily="18" charset="0"/>
+                        </a:rPr>
+                        <m:t>−</m:t>
+                      </m:r>
+                      <m:acc>
+                        <m:accPr>
+                          <m:chr m:val="⃗"/>
+                          <m:ctrlPr>
+                            <a:rPr lang="en-US" altLang="ko-KR" b="0" i="1" smtClean="0">
+                              <a:latin typeface="Cambria Math" panose="02040503050406030204" pitchFamily="18" charset="0"/>
+                            </a:rPr>
+                          </m:ctrlPr>
+                        </m:accPr>
+                        <m:e>
+                          <m:r>
+                            <a:rPr lang="en-US" altLang="ko-KR" b="0" i="1" smtClean="0">
+                              <a:latin typeface="Cambria Math" panose="02040503050406030204" pitchFamily="18" charset="0"/>
+                            </a:rPr>
+                            <m:t>𝑝</m:t>
+                          </m:r>
+                        </m:e>
+                      </m:acc>
+                    </m:oMath>
+                  </m:oMathPara>
+                </a14:m>
+                <a:endParaRPr lang="ko-KR" altLang="en-US" dirty="0"/>
+              </a:p>
+            </p:txBody>
+          </p:sp>
+        </mc:Choice>
+        <mc:Fallback>
+          <p:sp>
+            <p:nvSpPr>
+              <p:cNvPr id="18" name="TextBox 17">
+                <a:extLst>
+                  <a:ext uri="{FF2B5EF4-FFF2-40B4-BE49-F238E27FC236}">
+                    <a16:creationId xmlns:a16="http://schemas.microsoft.com/office/drawing/2014/main" id="{04D53F16-1B28-4E99-A385-214F85D9B350}"/>
+                  </a:ext>
+                </a:extLst>
+              </p:cNvPr>
+              <p:cNvSpPr txBox="1">
+                <a:spLocks noRot="1" noChangeAspect="1" noMove="1" noResize="1" noEditPoints="1" noAdjustHandles="1" noChangeArrowheads="1" noChangeShapeType="1" noTextEdit="1"/>
+              </p:cNvSpPr>
+              <p:nvPr/>
+            </p:nvSpPr>
+            <p:spPr>
+              <a:xfrm>
+                <a:off x="5155445" y="1869388"/>
+                <a:ext cx="1223540" cy="410305"/>
+              </a:xfrm>
+              <a:prstGeom prst="rect">
+                <a:avLst/>
+              </a:prstGeom>
+              <a:blipFill>
+                <a:blip r:embed="rId6"/>
+                <a:stretch>
+                  <a:fillRect t="-8955" r="-20500" b="-7463"/>
+                </a:stretch>
+              </a:blipFill>
+            </p:spPr>
+            <p:txBody>
+              <a:bodyPr/>
+              <a:lstStyle/>
+              <a:p>
+                <a:r>
+                  <a:rPr lang="ko-KR" altLang="en-US">
+                    <a:noFill/>
+                  </a:rPr>
+                  <a:t> </a:t>
+                </a:r>
+              </a:p>
+            </p:txBody>
+          </p:sp>
+        </mc:Fallback>
+      </mc:AlternateContent>
     </p:spTree>
     <p:extLst>
       <p:ext uri="{BB962C8B-B14F-4D97-AF65-F5344CB8AC3E}">

</xml_diff>

<commit_message>
linear regression pic3 의 벡터 위치 수정
</commit_message>
<xml_diff>
--- a/pics/2020-08-24-linear_regression/pics.pptx
+++ b/pics/2020-08-24-linear_regression/pics.pptx
@@ -106,7 +106,7 @@
   </p:defaultTextStyle>
   <p:extLst>
     <p:ext uri="{EFAFB233-063F-42B5-8137-9DF3F51BA10A}">
-      <p15:sldGuideLst xmlns:p15="http://schemas.microsoft.com/office/powerpoint/2012/main">
+      <p15:sldGuideLst xmlns:p15="http://schemas.microsoft.com/office/powerpoint/2012/main" xmlns="">
         <p15:guide id="1" orient="horz" pos="2160">
           <p15:clr>
             <a:srgbClr val="A4A3A4"/>
@@ -3149,6 +3149,9 @@
             <a:avLst/>
           </a:prstGeom>
           <a:ln w="28575">
+            <a:solidFill>
+              <a:schemeClr val="accent6"/>
+            </a:solidFill>
             <a:tailEnd type="arrow"/>
           </a:ln>
         </p:spPr>
@@ -3185,7 +3188,7 @@
           </a:prstGeom>
           <a:ln w="28575">
             <a:solidFill>
-              <a:schemeClr val="accent6"/>
+              <a:schemeClr val="accent1"/>
             </a:solidFill>
             <a:tailEnd type="arrow"/>
           </a:ln>
@@ -3424,7 +3427,7 @@
               <p:cNvPr id="2" name="TextBox 1">
                 <a:extLst>
                   <a:ext uri="{FF2B5EF4-FFF2-40B4-BE49-F238E27FC236}">
-                    <a16:creationId xmlns:a16="http://schemas.microsoft.com/office/drawing/2014/main" id="{DAC7E6F0-9276-4F03-9EE2-565FA8BBCE3F}"/>
+                    <a16:creationId xmlns:a16="http://schemas.microsoft.com/office/drawing/2014/main" xmlns="" id="{DAC7E6F0-9276-4F03-9EE2-565FA8BBCE3F}"/>
                   </a:ext>
                 </a:extLst>
               </p:cNvPr>
@@ -3434,7 +3437,7 @@
             <p:spPr>
               <a:xfrm>
                 <a:off x="5155446" y="3745674"/>
-                <a:ext cx="496674" cy="369332"/>
+                <a:ext cx="501996" cy="369332"/>
               </a:xfrm>
               <a:prstGeom prst="rect">
                 <a:avLst/>
@@ -3447,6 +3450,7 @@
               </a:bodyPr>
               <a:lstStyle/>
               <a:p>
+                <a:pPr/>
                 <a14:m>
                   <m:oMathPara xmlns:m="http://schemas.openxmlformats.org/officeDocument/2006/math">
                     <m:oMathParaPr>
@@ -3457,7 +3461,7 @@
                         <m:sSubPr>
                           <m:ctrlPr>
                             <a:rPr lang="en-US" altLang="ko-KR" b="0" i="1" smtClean="0">
-                              <a:latin typeface="Cambria Math" panose="02040503050406030204" pitchFamily="18" charset="0"/>
+                              <a:latin typeface="Cambria Math"/>
                             </a:rPr>
                           </m:ctrlPr>
                         </m:sSubPr>
@@ -3467,7 +3471,7 @@
                               <m:chr m:val="⃗"/>
                               <m:ctrlPr>
                                 <a:rPr lang="en-US" altLang="ko-KR" b="0" i="1" smtClean="0">
-                                  <a:latin typeface="Cambria Math" panose="02040503050406030204" pitchFamily="18" charset="0"/>
+                                  <a:latin typeface="Cambria Math"/>
                                 </a:rPr>
                               </m:ctrlPr>
                             </m:accPr>
@@ -3484,9 +3488,9 @@
                         <m:sub>
                           <m:r>
                             <a:rPr lang="en-US" altLang="ko-KR" b="0" i="1" smtClean="0">
-                              <a:latin typeface="Cambria Math" panose="02040503050406030204" pitchFamily="18" charset="0"/>
+                              <a:latin typeface="Cambria Math"/>
                             </a:rPr>
-                            <m:t>1</m:t>
+                            <m:t>2</m:t>
                           </m:r>
                         </m:sub>
                       </m:sSub>
@@ -3504,7 +3508,7 @@
               <p:cNvPr id="2" name="TextBox 1">
                 <a:extLst>
                   <a:ext uri="{FF2B5EF4-FFF2-40B4-BE49-F238E27FC236}">
-                    <a16:creationId xmlns:a16="http://schemas.microsoft.com/office/drawing/2014/main" id="{DAC7E6F0-9276-4F03-9EE2-565FA8BBCE3F}"/>
+                    <a16:creationId xmlns:a16="http://schemas.microsoft.com/office/drawing/2014/main" xmlns:a14="http://schemas.microsoft.com/office/drawing/2010/main" xmlns="" id="{DAC7E6F0-9276-4F03-9EE2-565FA8BBCE3F}"/>
                   </a:ext>
                 </a:extLst>
               </p:cNvPr>
@@ -3516,15 +3520,15 @@
             <p:spPr>
               <a:xfrm>
                 <a:off x="5155446" y="3745674"/>
-                <a:ext cx="496674" cy="369332"/>
+                <a:ext cx="501996" cy="369332"/>
               </a:xfrm>
               <a:prstGeom prst="rect">
                 <a:avLst/>
               </a:prstGeom>
-              <a:blipFill>
+              <a:blipFill rotWithShape="1">
                 <a:blip r:embed="rId2"/>
                 <a:stretch>
-                  <a:fillRect t="-19672" r="-22222" b="-1639"/>
+                  <a:fillRect t="-19672" r="-21951" b="-1639"/>
                 </a:stretch>
               </a:blipFill>
             </p:spPr>
@@ -3550,7 +3554,7 @@
               <p:cNvPr id="12" name="TextBox 11">
                 <a:extLst>
                   <a:ext uri="{FF2B5EF4-FFF2-40B4-BE49-F238E27FC236}">
-                    <a16:creationId xmlns:a16="http://schemas.microsoft.com/office/drawing/2014/main" id="{83EA6CDE-D8B1-4CB8-A3DA-AAB3CDBF821A}"/>
+                    <a16:creationId xmlns:a16="http://schemas.microsoft.com/office/drawing/2014/main" xmlns="" id="{83EA6CDE-D8B1-4CB8-A3DA-AAB3CDBF821A}"/>
                   </a:ext>
                 </a:extLst>
               </p:cNvPr>
@@ -3573,6 +3577,7 @@
               </a:bodyPr>
               <a:lstStyle/>
               <a:p>
+                <a:pPr/>
                 <a14:m>
                   <m:oMathPara xmlns:m="http://schemas.openxmlformats.org/officeDocument/2006/math">
                     <m:oMathParaPr>
@@ -3583,7 +3588,7 @@
                         <m:sSubPr>
                           <m:ctrlPr>
                             <a:rPr lang="en-US" altLang="ko-KR" b="0" i="1" smtClean="0">
-                              <a:latin typeface="Cambria Math" panose="02040503050406030204" pitchFamily="18" charset="0"/>
+                              <a:latin typeface="Cambria Math"/>
                             </a:rPr>
                           </m:ctrlPr>
                         </m:sSubPr>
@@ -3593,7 +3598,7 @@
                               <m:chr m:val="⃗"/>
                               <m:ctrlPr>
                                 <a:rPr lang="en-US" altLang="ko-KR" b="0" i="1" smtClean="0">
-                                  <a:latin typeface="Cambria Math" panose="02040503050406030204" pitchFamily="18" charset="0"/>
+                                  <a:latin typeface="Cambria Math"/>
                                 </a:rPr>
                               </m:ctrlPr>
                             </m:accPr>
@@ -3610,9 +3615,9 @@
                         <m:sub>
                           <m:r>
                             <a:rPr lang="en-US" altLang="ko-KR" b="0" i="1" smtClean="0">
-                              <a:latin typeface="Cambria Math" panose="02040503050406030204" pitchFamily="18" charset="0"/>
+                              <a:latin typeface="Cambria Math"/>
                             </a:rPr>
-                            <m:t>2</m:t>
+                            <m:t>1</m:t>
                           </m:r>
                         </m:sub>
                       </m:sSub>
@@ -3630,7 +3635,7 @@
               <p:cNvPr id="12" name="TextBox 11">
                 <a:extLst>
                   <a:ext uri="{FF2B5EF4-FFF2-40B4-BE49-F238E27FC236}">
-                    <a16:creationId xmlns:a16="http://schemas.microsoft.com/office/drawing/2014/main" id="{83EA6CDE-D8B1-4CB8-A3DA-AAB3CDBF821A}"/>
+                    <a16:creationId xmlns:a16="http://schemas.microsoft.com/office/drawing/2014/main" xmlns:a14="http://schemas.microsoft.com/office/drawing/2010/main" xmlns="" id="{83EA6CDE-D8B1-4CB8-A3DA-AAB3CDBF821A}"/>
                   </a:ext>
                 </a:extLst>
               </p:cNvPr>
@@ -3647,7 +3652,7 @@
               <a:prstGeom prst="rect">
                 <a:avLst/>
               </a:prstGeom>
-              <a:blipFill>
+              <a:blipFill rotWithShape="1">
                 <a:blip r:embed="rId3"/>
                 <a:stretch>
                   <a:fillRect t="-20000" r="-21687" b="-3333"/>
@@ -3669,14 +3674,14 @@
           </p:sp>
         </mc:Fallback>
       </mc:AlternateContent>
-      <mc:AlternateContent xmlns:mc="http://schemas.openxmlformats.org/markup-compatibility/2006">
-        <mc:Choice xmlns:a14="http://schemas.microsoft.com/office/drawing/2010/main" Requires="a14">
+      <mc:AlternateContent xmlns:mc="http://schemas.openxmlformats.org/markup-compatibility/2006" xmlns:a14="http://schemas.microsoft.com/office/drawing/2010/main">
+        <mc:Choice Requires="a14">
           <p:sp>
             <p:nvSpPr>
               <p:cNvPr id="15" name="TextBox 14">
                 <a:extLst>
                   <a:ext uri="{FF2B5EF4-FFF2-40B4-BE49-F238E27FC236}">
-                    <a16:creationId xmlns:a16="http://schemas.microsoft.com/office/drawing/2014/main" id="{9E686680-3D0D-4145-81F8-AF3A457B1DEF}"/>
+                    <a16:creationId xmlns:a16="http://schemas.microsoft.com/office/drawing/2014/main" xmlns="" id="{9E686680-3D0D-4145-81F8-AF3A457B1DEF}"/>
                   </a:ext>
                 </a:extLst>
               </p:cNvPr>
@@ -3699,6 +3704,7 @@
               </a:bodyPr>
               <a:lstStyle/>
               <a:p>
+                <a:pPr/>
                 <a14:m>
                   <m:oMathPara xmlns:m="http://schemas.openxmlformats.org/officeDocument/2006/math">
                     <m:oMathParaPr>
@@ -3710,7 +3716,7 @@
                           <m:chr m:val="⃗"/>
                           <m:ctrlPr>
                             <a:rPr lang="en-US" altLang="ko-KR" b="0" i="1" smtClean="0">
-                              <a:latin typeface="Cambria Math" panose="02040503050406030204" pitchFamily="18" charset="0"/>
+                              <a:latin typeface="Cambria Math"/>
                             </a:rPr>
                           </m:ctrlPr>
                         </m:accPr>
@@ -3731,7 +3737,7 @@
             </p:txBody>
           </p:sp>
         </mc:Choice>
-        <mc:Fallback>
+        <mc:Fallback xmlns="">
           <p:sp>
             <p:nvSpPr>
               <p:cNvPr id="15" name="TextBox 14">
@@ -3776,14 +3782,14 @@
           </p:sp>
         </mc:Fallback>
       </mc:AlternateContent>
-      <mc:AlternateContent xmlns:mc="http://schemas.openxmlformats.org/markup-compatibility/2006">
-        <mc:Choice xmlns:a14="http://schemas.microsoft.com/office/drawing/2010/main" Requires="a14">
+      <mc:AlternateContent xmlns:mc="http://schemas.openxmlformats.org/markup-compatibility/2006" xmlns:a14="http://schemas.microsoft.com/office/drawing/2010/main">
+        <mc:Choice Requires="a14">
           <p:sp>
             <p:nvSpPr>
               <p:cNvPr id="17" name="TextBox 16">
                 <a:extLst>
                   <a:ext uri="{FF2B5EF4-FFF2-40B4-BE49-F238E27FC236}">
-                    <a16:creationId xmlns:a16="http://schemas.microsoft.com/office/drawing/2014/main" id="{E04FC533-E85C-4D00-8D86-E283FD3FD216}"/>
+                    <a16:creationId xmlns:a16="http://schemas.microsoft.com/office/drawing/2014/main" xmlns="" id="{E04FC533-E85C-4D00-8D86-E283FD3FD216}"/>
                   </a:ext>
                 </a:extLst>
               </p:cNvPr>
@@ -3806,6 +3812,7 @@
               </a:bodyPr>
               <a:lstStyle/>
               <a:p>
+                <a:pPr/>
                 <a14:m>
                   <m:oMathPara xmlns:m="http://schemas.openxmlformats.org/officeDocument/2006/math">
                     <m:oMathParaPr>
@@ -3835,7 +3842,7 @@
                           <m:chr m:val="̂"/>
                           <m:ctrlPr>
                             <a:rPr lang="en-US" altLang="ko-KR" b="0" i="1" smtClean="0">
-                              <a:latin typeface="Cambria Math" panose="02040503050406030204" pitchFamily="18" charset="0"/>
+                              <a:latin typeface="Cambria Math"/>
                             </a:rPr>
                           </m:ctrlPr>
                         </m:accPr>
@@ -3856,7 +3863,7 @@
             </p:txBody>
           </p:sp>
         </mc:Choice>
-        <mc:Fallback>
+        <mc:Fallback xmlns="">
           <p:sp>
             <p:nvSpPr>
               <p:cNvPr id="17" name="TextBox 16">
@@ -3906,7 +3913,7 @@
           <p:cNvPr id="3" name="자유형: 도형 2">
             <a:extLst>
               <a:ext uri="{FF2B5EF4-FFF2-40B4-BE49-F238E27FC236}">
-                <a16:creationId xmlns:a16="http://schemas.microsoft.com/office/drawing/2014/main" id="{2B505BF8-318C-498F-B4D1-D9C45876A24C}"/>
+                <a16:creationId xmlns:a16="http://schemas.microsoft.com/office/drawing/2014/main" xmlns="" id="{2B505BF8-318C-498F-B4D1-D9C45876A24C}"/>
               </a:ext>
             </a:extLst>
           </p:cNvPr>
@@ -4003,14 +4010,14 @@
           </a:p>
         </p:txBody>
       </p:sp>
-      <mc:AlternateContent xmlns:mc="http://schemas.openxmlformats.org/markup-compatibility/2006">
-        <mc:Choice xmlns:a14="http://schemas.microsoft.com/office/drawing/2010/main" Requires="a14">
+      <mc:AlternateContent xmlns:mc="http://schemas.openxmlformats.org/markup-compatibility/2006" xmlns:a14="http://schemas.microsoft.com/office/drawing/2010/main">
+        <mc:Choice Requires="a14">
           <p:sp>
             <p:nvSpPr>
               <p:cNvPr id="18" name="TextBox 17">
                 <a:extLst>
                   <a:ext uri="{FF2B5EF4-FFF2-40B4-BE49-F238E27FC236}">
-                    <a16:creationId xmlns:a16="http://schemas.microsoft.com/office/drawing/2014/main" id="{04D53F16-1B28-4E99-A385-214F85D9B350}"/>
+                    <a16:creationId xmlns:a16="http://schemas.microsoft.com/office/drawing/2014/main" xmlns="" id="{04D53F16-1B28-4E99-A385-214F85D9B350}"/>
                   </a:ext>
                 </a:extLst>
               </p:cNvPr>
@@ -4033,6 +4040,7 @@
               </a:bodyPr>
               <a:lstStyle/>
               <a:p>
+                <a:pPr/>
                 <a14:m>
                   <m:oMathPara xmlns:m="http://schemas.openxmlformats.org/officeDocument/2006/math">
                     <m:oMathParaPr>
@@ -4044,7 +4052,7 @@
                           <m:chr m:val="⃗"/>
                           <m:ctrlPr>
                             <a:rPr lang="en-US" altLang="ko-KR" b="0" i="1" smtClean="0">
-                              <a:latin typeface="Cambria Math" panose="02040503050406030204" pitchFamily="18" charset="0"/>
+                              <a:latin typeface="Cambria Math"/>
                             </a:rPr>
                           </m:ctrlPr>
                         </m:accPr>
@@ -4068,7 +4076,7 @@
                           <m:chr m:val="⃗"/>
                           <m:ctrlPr>
                             <a:rPr lang="en-US" altLang="ko-KR" b="0" i="1" smtClean="0">
-                              <a:latin typeface="Cambria Math" panose="02040503050406030204" pitchFamily="18" charset="0"/>
+                              <a:latin typeface="Cambria Math"/>
                             </a:rPr>
                           </m:ctrlPr>
                         </m:accPr>
@@ -4092,7 +4100,7 @@
                           <m:chr m:val="⃗"/>
                           <m:ctrlPr>
                             <a:rPr lang="en-US" altLang="ko-KR" b="0" i="1" smtClean="0">
-                              <a:latin typeface="Cambria Math" panose="02040503050406030204" pitchFamily="18" charset="0"/>
+                              <a:latin typeface="Cambria Math"/>
                             </a:rPr>
                           </m:ctrlPr>
                         </m:accPr>
@@ -4113,7 +4121,7 @@
             </p:txBody>
           </p:sp>
         </mc:Choice>
-        <mc:Fallback>
+        <mc:Fallback xmlns="">
           <p:sp>
             <p:nvSpPr>
               <p:cNvPr id="18" name="TextBox 17">

</xml_diff>

<commit_message>
linear regression 그림 번호 수정
</commit_message>
<xml_diff>
--- a/pics/2020-08-24-linear_regression/pics.pptx
+++ b/pics/2020-08-24-linear_regression/pics.pptx
@@ -5,7 +5,8 @@
     <p:sldMasterId id="2147483648" r:id="rId1"/>
   </p:sldMasterIdLst>
   <p:sldIdLst>
-    <p:sldId id="256" r:id="rId2"/>
+    <p:sldId id="257" r:id="rId2"/>
+    <p:sldId id="256" r:id="rId3"/>
   </p:sldIdLst>
   <p:sldSz cx="9144000" cy="6858000" type="screen4x3"/>
   <p:notesSz cx="6858000" cy="9144000"/>
@@ -106,7 +107,7 @@
   </p:defaultTextStyle>
   <p:extLst>
     <p:ext uri="{EFAFB233-063F-42B5-8137-9DF3F51BA10A}">
-      <p15:sldGuideLst xmlns:p15="http://schemas.microsoft.com/office/powerpoint/2012/main" xmlns="">
+      <p15:sldGuideLst xmlns:p15="http://schemas.microsoft.com/office/powerpoint/2012/main">
         <p15:guide id="1" orient="horz" pos="2160">
           <p15:clr>
             <a:srgbClr val="A4A3A4"/>
@@ -3030,6 +3031,936 @@
           <a:chExt cx="0" cy="0"/>
         </a:xfrm>
       </p:grpSpPr>
+      <p:grpSp>
+        <p:nvGrpSpPr>
+          <p:cNvPr id="22" name="그룹 21">
+            <a:extLst>
+              <a:ext uri="{FF2B5EF4-FFF2-40B4-BE49-F238E27FC236}">
+                <a16:creationId xmlns:a16="http://schemas.microsoft.com/office/drawing/2014/main" id="{13A906B1-2FA6-452F-8590-8E759E44393B}"/>
+              </a:ext>
+            </a:extLst>
+          </p:cNvPr>
+          <p:cNvGrpSpPr/>
+          <p:nvPr/>
+        </p:nvGrpSpPr>
+        <p:grpSpPr>
+          <a:xfrm>
+            <a:off x="2349500" y="2111375"/>
+            <a:ext cx="4445000" cy="2635250"/>
+            <a:chOff x="2349500" y="1196752"/>
+            <a:chExt cx="4445000" cy="2635250"/>
+          </a:xfrm>
+        </p:grpSpPr>
+        <p:sp>
+          <p:nvSpPr>
+            <p:cNvPr id="4" name="자유형 8">
+              <a:extLst>
+                <a:ext uri="{FF2B5EF4-FFF2-40B4-BE49-F238E27FC236}">
+                  <a16:creationId xmlns:a16="http://schemas.microsoft.com/office/drawing/2014/main" id="{A629945C-7B69-49EB-8DCD-216A11C8F75E}"/>
+                </a:ext>
+              </a:extLst>
+            </p:cNvPr>
+            <p:cNvSpPr/>
+            <p:nvPr/>
+          </p:nvSpPr>
+          <p:spPr>
+            <a:xfrm>
+              <a:off x="2349500" y="1196752"/>
+              <a:ext cx="4445000" cy="2635250"/>
+            </a:xfrm>
+            <a:custGeom>
+              <a:avLst/>
+              <a:gdLst>
+                <a:gd name="connsiteX0" fmla="*/ 0 w 4445000"/>
+                <a:gd name="connsiteY0" fmla="*/ 2146300 h 2635250"/>
+                <a:gd name="connsiteX1" fmla="*/ 2381250 w 4445000"/>
+                <a:gd name="connsiteY1" fmla="*/ 2635250 h 2635250"/>
+                <a:gd name="connsiteX2" fmla="*/ 4445000 w 4445000"/>
+                <a:gd name="connsiteY2" fmla="*/ 488950 h 2635250"/>
+                <a:gd name="connsiteX3" fmla="*/ 2076450 w 4445000"/>
+                <a:gd name="connsiteY3" fmla="*/ 0 h 2635250"/>
+                <a:gd name="connsiteX4" fmla="*/ 0 w 4445000"/>
+                <a:gd name="connsiteY4" fmla="*/ 2146300 h 2635250"/>
+              </a:gdLst>
+              <a:ahLst/>
+              <a:cxnLst>
+                <a:cxn ang="0">
+                  <a:pos x="connsiteX0" y="connsiteY0"/>
+                </a:cxn>
+                <a:cxn ang="0">
+                  <a:pos x="connsiteX1" y="connsiteY1"/>
+                </a:cxn>
+                <a:cxn ang="0">
+                  <a:pos x="connsiteX2" y="connsiteY2"/>
+                </a:cxn>
+                <a:cxn ang="0">
+                  <a:pos x="connsiteX3" y="connsiteY3"/>
+                </a:cxn>
+                <a:cxn ang="0">
+                  <a:pos x="connsiteX4" y="connsiteY4"/>
+                </a:cxn>
+              </a:cxnLst>
+              <a:rect l="l" t="t" r="r" b="b"/>
+              <a:pathLst>
+                <a:path w="4445000" h="2635250">
+                  <a:moveTo>
+                    <a:pt x="0" y="2146300"/>
+                  </a:moveTo>
+                  <a:lnTo>
+                    <a:pt x="2381250" y="2635250"/>
+                  </a:lnTo>
+                  <a:lnTo>
+                    <a:pt x="4445000" y="488950"/>
+                  </a:lnTo>
+                  <a:lnTo>
+                    <a:pt x="2076450" y="0"/>
+                  </a:lnTo>
+                  <a:lnTo>
+                    <a:pt x="0" y="2146300"/>
+                  </a:lnTo>
+                  <a:close/>
+                </a:path>
+              </a:pathLst>
+            </a:custGeom>
+            <a:solidFill>
+              <a:schemeClr val="accent3">
+                <a:lumMod val="20000"/>
+                <a:lumOff val="80000"/>
+              </a:schemeClr>
+            </a:solidFill>
+            <a:ln>
+              <a:solidFill>
+                <a:schemeClr val="bg1">
+                  <a:lumMod val="85000"/>
+                </a:schemeClr>
+              </a:solidFill>
+            </a:ln>
+          </p:spPr>
+          <p:style>
+            <a:lnRef idx="2">
+              <a:schemeClr val="accent1">
+                <a:shade val="50000"/>
+              </a:schemeClr>
+            </a:lnRef>
+            <a:fillRef idx="1">
+              <a:schemeClr val="accent1"/>
+            </a:fillRef>
+            <a:effectRef idx="0">
+              <a:schemeClr val="accent1"/>
+            </a:effectRef>
+            <a:fontRef idx="minor">
+              <a:schemeClr val="lt1"/>
+            </a:fontRef>
+          </p:style>
+          <p:txBody>
+            <a:bodyPr rtlCol="0" anchor="ctr"/>
+            <a:lstStyle/>
+            <a:p>
+              <a:pPr algn="ctr"/>
+              <a:endParaRPr lang="ko-KR" altLang="en-US" dirty="0"/>
+            </a:p>
+          </p:txBody>
+        </p:sp>
+        <p:cxnSp>
+          <p:nvCxnSpPr>
+            <p:cNvPr id="5" name="직선 화살표 연결선 4">
+              <a:extLst>
+                <a:ext uri="{FF2B5EF4-FFF2-40B4-BE49-F238E27FC236}">
+                  <a16:creationId xmlns:a16="http://schemas.microsoft.com/office/drawing/2014/main" id="{02A3CE4E-CE52-42E7-9BA8-4479C61114F0}"/>
+                </a:ext>
+              </a:extLst>
+            </p:cNvPr>
+            <p:cNvCxnSpPr/>
+            <p:nvPr/>
+          </p:nvCxnSpPr>
+          <p:spPr>
+            <a:xfrm flipV="1">
+              <a:off x="3563888" y="2915816"/>
+              <a:ext cx="1656184" cy="144016"/>
+            </a:xfrm>
+            <a:prstGeom prst="straightConnector1">
+              <a:avLst/>
+            </a:prstGeom>
+            <a:ln w="28575">
+              <a:tailEnd type="arrow"/>
+            </a:ln>
+          </p:spPr>
+          <p:style>
+            <a:lnRef idx="1">
+              <a:schemeClr val="accent1"/>
+            </a:lnRef>
+            <a:fillRef idx="0">
+              <a:schemeClr val="accent1"/>
+            </a:fillRef>
+            <a:effectRef idx="0">
+              <a:schemeClr val="accent1"/>
+            </a:effectRef>
+            <a:fontRef idx="minor">
+              <a:schemeClr val="tx1"/>
+            </a:fontRef>
+          </p:style>
+        </p:cxnSp>
+        <p:cxnSp>
+          <p:nvCxnSpPr>
+            <p:cNvPr id="6" name="직선 화살표 연결선 5">
+              <a:extLst>
+                <a:ext uri="{FF2B5EF4-FFF2-40B4-BE49-F238E27FC236}">
+                  <a16:creationId xmlns:a16="http://schemas.microsoft.com/office/drawing/2014/main" id="{B9B69A02-D7F4-4536-BD0C-DF8A0A3F11BE}"/>
+                </a:ext>
+              </a:extLst>
+            </p:cNvPr>
+            <p:cNvCxnSpPr>
+              <a:cxnSpLocks/>
+            </p:cNvCxnSpPr>
+            <p:nvPr/>
+          </p:nvCxnSpPr>
+          <p:spPr>
+            <a:xfrm flipH="1" flipV="1">
+              <a:off x="3439662" y="2339752"/>
+              <a:ext cx="124227" cy="720080"/>
+            </a:xfrm>
+            <a:prstGeom prst="straightConnector1">
+              <a:avLst/>
+            </a:prstGeom>
+            <a:ln w="28575">
+              <a:solidFill>
+                <a:schemeClr val="accent6"/>
+              </a:solidFill>
+              <a:tailEnd type="arrow"/>
+            </a:ln>
+          </p:spPr>
+          <p:style>
+            <a:lnRef idx="1">
+              <a:schemeClr val="accent1"/>
+            </a:lnRef>
+            <a:fillRef idx="0">
+              <a:schemeClr val="accent1"/>
+            </a:fillRef>
+            <a:effectRef idx="0">
+              <a:schemeClr val="accent1"/>
+            </a:effectRef>
+            <a:fontRef idx="minor">
+              <a:schemeClr val="tx1"/>
+            </a:fontRef>
+          </p:style>
+        </p:cxnSp>
+        <p:cxnSp>
+          <p:nvCxnSpPr>
+            <p:cNvPr id="9" name="직선 연결선 8">
+              <a:extLst>
+                <a:ext uri="{FF2B5EF4-FFF2-40B4-BE49-F238E27FC236}">
+                  <a16:creationId xmlns:a16="http://schemas.microsoft.com/office/drawing/2014/main" id="{46939F9B-9FD7-4472-B7BF-E8D8FEBB722B}"/>
+                </a:ext>
+              </a:extLst>
+            </p:cNvPr>
+            <p:cNvCxnSpPr>
+              <a:cxnSpLocks/>
+            </p:cNvCxnSpPr>
+            <p:nvPr/>
+          </p:nvCxnSpPr>
+          <p:spPr>
+            <a:xfrm flipH="1">
+              <a:off x="3563888" y="1871700"/>
+              <a:ext cx="1686080" cy="1188132"/>
+            </a:xfrm>
+            <a:prstGeom prst="line">
+              <a:avLst/>
+            </a:prstGeom>
+            <a:ln w="19050">
+              <a:solidFill>
+                <a:schemeClr val="tx1"/>
+              </a:solidFill>
+              <a:prstDash val="solid"/>
+              <a:headEnd type="arrow" w="med" len="med"/>
+              <a:tailEnd type="none" w="med" len="med"/>
+            </a:ln>
+          </p:spPr>
+          <p:style>
+            <a:lnRef idx="1">
+              <a:schemeClr val="accent1"/>
+            </a:lnRef>
+            <a:fillRef idx="0">
+              <a:schemeClr val="accent1"/>
+            </a:fillRef>
+            <a:effectRef idx="0">
+              <a:schemeClr val="accent1"/>
+            </a:effectRef>
+            <a:fontRef idx="minor">
+              <a:schemeClr val="tx1"/>
+            </a:fontRef>
+          </p:style>
+        </p:cxnSp>
+        <p:sp>
+          <p:nvSpPr>
+            <p:cNvPr id="12" name="TextBox 11">
+              <a:extLst>
+                <a:ext uri="{FF2B5EF4-FFF2-40B4-BE49-F238E27FC236}">
+                  <a16:creationId xmlns:a16="http://schemas.microsoft.com/office/drawing/2014/main" id="{CE91DFE4-3CF2-4037-8956-35C10C697F32}"/>
+                </a:ext>
+              </a:extLst>
+            </p:cNvPr>
+            <p:cNvSpPr txBox="1"/>
+            <p:nvPr/>
+          </p:nvSpPr>
+          <p:spPr>
+            <a:xfrm>
+              <a:off x="4138227" y="3266564"/>
+              <a:ext cx="867545" cy="369332"/>
+            </a:xfrm>
+            <a:prstGeom prst="rect">
+              <a:avLst/>
+            </a:prstGeom>
+            <a:noFill/>
+          </p:spPr>
+          <p:txBody>
+            <a:bodyPr wrap="none" rtlCol="0">
+              <a:spAutoFit/>
+            </a:bodyPr>
+            <a:lstStyle/>
+            <a:p>
+              <a:r>
+                <a:rPr lang="en-US" altLang="ko-KR" b="1" dirty="0"/>
+                <a:t>Col(A)</a:t>
+              </a:r>
+              <a:endParaRPr lang="ko-KR" altLang="en-US" b="1" dirty="0"/>
+            </a:p>
+          </p:txBody>
+        </p:sp>
+        <mc:AlternateContent xmlns:mc="http://schemas.openxmlformats.org/markup-compatibility/2006">
+          <mc:Choice xmlns:a14="http://schemas.microsoft.com/office/drawing/2010/main" Requires="a14">
+            <p:sp>
+              <p:nvSpPr>
+                <p:cNvPr id="13" name="TextBox 12">
+                  <a:extLst>
+                    <a:ext uri="{FF2B5EF4-FFF2-40B4-BE49-F238E27FC236}">
+                      <a16:creationId xmlns:a16="http://schemas.microsoft.com/office/drawing/2014/main" id="{7288BA86-B734-4849-989D-010A3169D053}"/>
+                    </a:ext>
+                  </a:extLst>
+                </p:cNvPr>
+                <p:cNvSpPr txBox="1"/>
+                <p:nvPr/>
+              </p:nvSpPr>
+              <p:spPr>
+                <a:xfrm>
+                  <a:off x="5155446" y="2656426"/>
+                  <a:ext cx="496674" cy="369332"/>
+                </a:xfrm>
+                <a:prstGeom prst="rect">
+                  <a:avLst/>
+                </a:prstGeom>
+                <a:noFill/>
+              </p:spPr>
+              <p:txBody>
+                <a:bodyPr wrap="none" rtlCol="0">
+                  <a:spAutoFit/>
+                </a:bodyPr>
+                <a:lstStyle/>
+                <a:p>
+                  <a:pPr/>
+                  <a14:m>
+                    <m:oMathPara xmlns:m="http://schemas.openxmlformats.org/officeDocument/2006/math">
+                      <m:oMathParaPr>
+                        <m:jc m:val="centerGroup"/>
+                      </m:oMathParaPr>
+                      <m:oMath xmlns:m="http://schemas.openxmlformats.org/officeDocument/2006/math">
+                        <m:sSub>
+                          <m:sSubPr>
+                            <m:ctrlPr>
+                              <a:rPr lang="en-US" altLang="ko-KR" b="0" i="1" smtClean="0">
+                                <a:latin typeface="Cambria Math" panose="02040503050406030204" pitchFamily="18" charset="0"/>
+                              </a:rPr>
+                            </m:ctrlPr>
+                          </m:sSubPr>
+                          <m:e>
+                            <m:acc>
+                              <m:accPr>
+                                <m:chr m:val="⃗"/>
+                                <m:ctrlPr>
+                                  <a:rPr lang="en-US" altLang="ko-KR" b="0" i="1" smtClean="0">
+                                    <a:latin typeface="Cambria Math" panose="02040503050406030204" pitchFamily="18" charset="0"/>
+                                  </a:rPr>
+                                </m:ctrlPr>
+                              </m:accPr>
+                              <m:e>
+                                <m:r>
+                                  <a:rPr lang="en-US" altLang="ko-KR" b="0" i="1" smtClean="0">
+                                    <a:latin typeface="Cambria Math" panose="02040503050406030204" pitchFamily="18" charset="0"/>
+                                  </a:rPr>
+                                  <m:t>𝑎</m:t>
+                                </m:r>
+                              </m:e>
+                            </m:acc>
+                          </m:e>
+                          <m:sub>
+                            <m:r>
+                              <a:rPr lang="en-US" altLang="ko-KR" b="0" i="1" smtClean="0">
+                                <a:latin typeface="Cambria Math" panose="02040503050406030204" pitchFamily="18" charset="0"/>
+                              </a:rPr>
+                              <m:t>1</m:t>
+                            </m:r>
+                          </m:sub>
+                        </m:sSub>
+                      </m:oMath>
+                    </m:oMathPara>
+                  </a14:m>
+                  <a:endParaRPr lang="ko-KR" altLang="en-US" dirty="0"/>
+                </a:p>
+              </p:txBody>
+            </p:sp>
+          </mc:Choice>
+          <mc:Fallback>
+            <p:sp>
+              <p:nvSpPr>
+                <p:cNvPr id="13" name="TextBox 12">
+                  <a:extLst>
+                    <a:ext uri="{FF2B5EF4-FFF2-40B4-BE49-F238E27FC236}">
+                      <a16:creationId xmlns:a16="http://schemas.microsoft.com/office/drawing/2014/main" id="{7288BA86-B734-4849-989D-010A3169D053}"/>
+                    </a:ext>
+                  </a:extLst>
+                </p:cNvPr>
+                <p:cNvSpPr txBox="1">
+                  <a:spLocks noRot="1" noChangeAspect="1" noMove="1" noResize="1" noEditPoints="1" noAdjustHandles="1" noChangeArrowheads="1" noChangeShapeType="1" noTextEdit="1"/>
+                </p:cNvSpPr>
+                <p:nvPr/>
+              </p:nvSpPr>
+              <p:spPr>
+                <a:xfrm>
+                  <a:off x="5155446" y="2656426"/>
+                  <a:ext cx="496674" cy="369332"/>
+                </a:xfrm>
+                <a:prstGeom prst="rect">
+                  <a:avLst/>
+                </a:prstGeom>
+                <a:blipFill>
+                  <a:blip r:embed="rId2"/>
+                  <a:stretch>
+                    <a:fillRect t="-20000" r="-22222" b="-3333"/>
+                  </a:stretch>
+                </a:blipFill>
+              </p:spPr>
+              <p:txBody>
+                <a:bodyPr/>
+                <a:lstStyle/>
+                <a:p>
+                  <a:r>
+                    <a:rPr lang="ko-KR" altLang="en-US">
+                      <a:noFill/>
+                    </a:rPr>
+                    <a:t> </a:t>
+                  </a:r>
+                </a:p>
+              </p:txBody>
+            </p:sp>
+          </mc:Fallback>
+        </mc:AlternateContent>
+        <mc:AlternateContent xmlns:mc="http://schemas.openxmlformats.org/markup-compatibility/2006">
+          <mc:Choice xmlns:a14="http://schemas.microsoft.com/office/drawing/2010/main" Requires="a14">
+            <p:sp>
+              <p:nvSpPr>
+                <p:cNvPr id="14" name="TextBox 13">
+                  <a:extLst>
+                    <a:ext uri="{FF2B5EF4-FFF2-40B4-BE49-F238E27FC236}">
+                      <a16:creationId xmlns:a16="http://schemas.microsoft.com/office/drawing/2014/main" id="{0D52119C-E02B-46C6-9277-A3857082CD1F}"/>
+                    </a:ext>
+                  </a:extLst>
+                </p:cNvPr>
+                <p:cNvSpPr txBox="1"/>
+                <p:nvPr/>
+              </p:nvSpPr>
+              <p:spPr>
+                <a:xfrm>
+                  <a:off x="3043341" y="2397036"/>
+                  <a:ext cx="501996" cy="369332"/>
+                </a:xfrm>
+                <a:prstGeom prst="rect">
+                  <a:avLst/>
+                </a:prstGeom>
+                <a:noFill/>
+              </p:spPr>
+              <p:txBody>
+                <a:bodyPr wrap="none" rtlCol="0">
+                  <a:spAutoFit/>
+                </a:bodyPr>
+                <a:lstStyle/>
+                <a:p>
+                  <a:pPr/>
+                  <a14:m>
+                    <m:oMathPara xmlns:m="http://schemas.openxmlformats.org/officeDocument/2006/math">
+                      <m:oMathParaPr>
+                        <m:jc m:val="centerGroup"/>
+                      </m:oMathParaPr>
+                      <m:oMath xmlns:m="http://schemas.openxmlformats.org/officeDocument/2006/math">
+                        <m:sSub>
+                          <m:sSubPr>
+                            <m:ctrlPr>
+                              <a:rPr lang="en-US" altLang="ko-KR" b="0" i="1" smtClean="0">
+                                <a:latin typeface="Cambria Math" panose="02040503050406030204" pitchFamily="18" charset="0"/>
+                              </a:rPr>
+                            </m:ctrlPr>
+                          </m:sSubPr>
+                          <m:e>
+                            <m:acc>
+                              <m:accPr>
+                                <m:chr m:val="⃗"/>
+                                <m:ctrlPr>
+                                  <a:rPr lang="en-US" altLang="ko-KR" b="0" i="1" smtClean="0">
+                                    <a:latin typeface="Cambria Math" panose="02040503050406030204" pitchFamily="18" charset="0"/>
+                                  </a:rPr>
+                                </m:ctrlPr>
+                              </m:accPr>
+                              <m:e>
+                                <m:r>
+                                  <a:rPr lang="en-US" altLang="ko-KR" b="0" i="1" smtClean="0">
+                                    <a:latin typeface="Cambria Math" panose="02040503050406030204" pitchFamily="18" charset="0"/>
+                                  </a:rPr>
+                                  <m:t>𝑎</m:t>
+                                </m:r>
+                              </m:e>
+                            </m:acc>
+                          </m:e>
+                          <m:sub>
+                            <m:r>
+                              <a:rPr lang="en-US" altLang="ko-KR" b="0" i="1" smtClean="0">
+                                <a:latin typeface="Cambria Math" panose="02040503050406030204" pitchFamily="18" charset="0"/>
+                              </a:rPr>
+                              <m:t>2</m:t>
+                            </m:r>
+                          </m:sub>
+                        </m:sSub>
+                      </m:oMath>
+                    </m:oMathPara>
+                  </a14:m>
+                  <a:endParaRPr lang="ko-KR" altLang="en-US" dirty="0"/>
+                </a:p>
+              </p:txBody>
+            </p:sp>
+          </mc:Choice>
+          <mc:Fallback>
+            <p:sp>
+              <p:nvSpPr>
+                <p:cNvPr id="14" name="TextBox 13">
+                  <a:extLst>
+                    <a:ext uri="{FF2B5EF4-FFF2-40B4-BE49-F238E27FC236}">
+                      <a16:creationId xmlns:a16="http://schemas.microsoft.com/office/drawing/2014/main" id="{0D52119C-E02B-46C6-9277-A3857082CD1F}"/>
+                    </a:ext>
+                  </a:extLst>
+                </p:cNvPr>
+                <p:cNvSpPr txBox="1">
+                  <a:spLocks noRot="1" noChangeAspect="1" noMove="1" noResize="1" noEditPoints="1" noAdjustHandles="1" noChangeArrowheads="1" noChangeShapeType="1" noTextEdit="1"/>
+                </p:cNvSpPr>
+                <p:nvPr/>
+              </p:nvSpPr>
+              <p:spPr>
+                <a:xfrm>
+                  <a:off x="3043341" y="2397036"/>
+                  <a:ext cx="501996" cy="369332"/>
+                </a:xfrm>
+                <a:prstGeom prst="rect">
+                  <a:avLst/>
+                </a:prstGeom>
+                <a:blipFill>
+                  <a:blip r:embed="rId3"/>
+                  <a:stretch>
+                    <a:fillRect t="-19672" r="-21687" b="-1639"/>
+                  </a:stretch>
+                </a:blipFill>
+              </p:spPr>
+              <p:txBody>
+                <a:bodyPr/>
+                <a:lstStyle/>
+                <a:p>
+                  <a:r>
+                    <a:rPr lang="ko-KR" altLang="en-US">
+                      <a:noFill/>
+                    </a:rPr>
+                    <a:t> </a:t>
+                  </a:r>
+                </a:p>
+              </p:txBody>
+            </p:sp>
+          </mc:Fallback>
+        </mc:AlternateContent>
+        <mc:AlternateContent xmlns:mc="http://schemas.openxmlformats.org/markup-compatibility/2006">
+          <mc:Choice xmlns:a14="http://schemas.microsoft.com/office/drawing/2010/main" Requires="a14">
+            <p:sp>
+              <p:nvSpPr>
+                <p:cNvPr id="16" name="TextBox 15">
+                  <a:extLst>
+                    <a:ext uri="{FF2B5EF4-FFF2-40B4-BE49-F238E27FC236}">
+                      <a16:creationId xmlns:a16="http://schemas.microsoft.com/office/drawing/2014/main" id="{C4C34268-5B91-4420-AA04-5B742119DD80}"/>
+                    </a:ext>
+                  </a:extLst>
+                </p:cNvPr>
+                <p:cNvSpPr txBox="1"/>
+                <p:nvPr/>
+              </p:nvSpPr>
+              <p:spPr>
+                <a:xfrm rot="660000">
+                  <a:off x="4521970" y="1436186"/>
+                  <a:ext cx="1891159" cy="410305"/>
+                </a:xfrm>
+                <a:prstGeom prst="rect">
+                  <a:avLst/>
+                </a:prstGeom>
+                <a:noFill/>
+              </p:spPr>
+              <p:txBody>
+                <a:bodyPr wrap="none" rtlCol="0">
+                  <a:spAutoFit/>
+                </a:bodyPr>
+                <a:lstStyle/>
+                <a:p>
+                  <a:pPr/>
+                  <a14:m>
+                    <m:oMathPara xmlns:m="http://schemas.openxmlformats.org/officeDocument/2006/math">
+                      <m:oMathParaPr>
+                        <m:jc m:val="centerGroup"/>
+                      </m:oMathParaPr>
+                      <m:oMath xmlns:m="http://schemas.openxmlformats.org/officeDocument/2006/math">
+                        <m:acc>
+                          <m:accPr>
+                            <m:chr m:val="⃗"/>
+                            <m:ctrlPr>
+                              <a:rPr lang="en-US" altLang="ko-KR" b="0" i="1" smtClean="0">
+                                <a:latin typeface="Cambria Math" panose="02040503050406030204" pitchFamily="18" charset="0"/>
+                              </a:rPr>
+                            </m:ctrlPr>
+                          </m:accPr>
+                          <m:e>
+                            <m:r>
+                              <a:rPr lang="en-US" altLang="ko-KR" b="0" i="1" smtClean="0">
+                                <a:latin typeface="Cambria Math" panose="02040503050406030204" pitchFamily="18" charset="0"/>
+                              </a:rPr>
+                              <m:t>𝑏</m:t>
+                            </m:r>
+                          </m:e>
+                        </m:acc>
+                        <m:r>
+                          <a:rPr lang="en-US" altLang="ko-KR" b="0" i="1" smtClean="0">
+                            <a:latin typeface="Cambria Math" panose="02040503050406030204" pitchFamily="18" charset="0"/>
+                          </a:rPr>
+                          <m:t>=</m:t>
+                        </m:r>
+                        <m:sSub>
+                          <m:sSubPr>
+                            <m:ctrlPr>
+                              <a:rPr lang="en-US" altLang="ko-KR" b="0" i="1" smtClean="0">
+                                <a:latin typeface="Cambria Math" panose="02040503050406030204" pitchFamily="18" charset="0"/>
+                              </a:rPr>
+                            </m:ctrlPr>
+                          </m:sSubPr>
+                          <m:e>
+                            <m:sSub>
+                              <m:sSubPr>
+                                <m:ctrlPr>
+                                  <a:rPr lang="en-US" altLang="ko-KR" b="0" i="1" smtClean="0">
+                                    <a:latin typeface="Cambria Math" panose="02040503050406030204" pitchFamily="18" charset="0"/>
+                                  </a:rPr>
+                                </m:ctrlPr>
+                              </m:sSubPr>
+                              <m:e>
+                                <m:r>
+                                  <a:rPr lang="en-US" altLang="ko-KR" b="0" i="1" smtClean="0">
+                                    <a:latin typeface="Cambria Math" panose="02040503050406030204" pitchFamily="18" charset="0"/>
+                                  </a:rPr>
+                                  <m:t>𝑥</m:t>
+                                </m:r>
+                              </m:e>
+                              <m:sub>
+                                <m:r>
+                                  <a:rPr lang="en-US" altLang="ko-KR" b="0" i="1" smtClean="0">
+                                    <a:latin typeface="Cambria Math" panose="02040503050406030204" pitchFamily="18" charset="0"/>
+                                  </a:rPr>
+                                  <m:t>1</m:t>
+                                </m:r>
+                              </m:sub>
+                            </m:sSub>
+                            <m:acc>
+                              <m:accPr>
+                                <m:chr m:val="⃗"/>
+                                <m:ctrlPr>
+                                  <a:rPr lang="en-US" altLang="ko-KR" b="0" i="1" smtClean="0">
+                                    <a:latin typeface="Cambria Math" panose="02040503050406030204" pitchFamily="18" charset="0"/>
+                                  </a:rPr>
+                                </m:ctrlPr>
+                              </m:accPr>
+                              <m:e>
+                                <m:r>
+                                  <a:rPr lang="en-US" altLang="ko-KR" b="0" i="1" smtClean="0">
+                                    <a:latin typeface="Cambria Math" panose="02040503050406030204" pitchFamily="18" charset="0"/>
+                                  </a:rPr>
+                                  <m:t>𝑎</m:t>
+                                </m:r>
+                              </m:e>
+                            </m:acc>
+                          </m:e>
+                          <m:sub>
+                            <m:r>
+                              <a:rPr lang="en-US" altLang="ko-KR" b="0" i="1" smtClean="0">
+                                <a:latin typeface="Cambria Math" panose="02040503050406030204" pitchFamily="18" charset="0"/>
+                              </a:rPr>
+                              <m:t>1</m:t>
+                            </m:r>
+                          </m:sub>
+                        </m:sSub>
+                        <m:r>
+                          <a:rPr lang="en-US" altLang="ko-KR" b="0" i="1" smtClean="0">
+                            <a:latin typeface="Cambria Math" panose="02040503050406030204" pitchFamily="18" charset="0"/>
+                          </a:rPr>
+                          <m:t>+</m:t>
+                        </m:r>
+                        <m:sSub>
+                          <m:sSubPr>
+                            <m:ctrlPr>
+                              <a:rPr lang="en-US" altLang="ko-KR" b="0" i="1" smtClean="0">
+                                <a:latin typeface="Cambria Math" panose="02040503050406030204" pitchFamily="18" charset="0"/>
+                              </a:rPr>
+                            </m:ctrlPr>
+                          </m:sSubPr>
+                          <m:e>
+                            <m:r>
+                              <a:rPr lang="en-US" altLang="ko-KR" b="0" i="1" smtClean="0">
+                                <a:latin typeface="Cambria Math" panose="02040503050406030204" pitchFamily="18" charset="0"/>
+                              </a:rPr>
+                              <m:t>𝑥</m:t>
+                            </m:r>
+                          </m:e>
+                          <m:sub>
+                            <m:r>
+                              <a:rPr lang="en-US" altLang="ko-KR" b="0" i="1" smtClean="0">
+                                <a:latin typeface="Cambria Math" panose="02040503050406030204" pitchFamily="18" charset="0"/>
+                              </a:rPr>
+                              <m:t>2</m:t>
+                            </m:r>
+                          </m:sub>
+                        </m:sSub>
+                        <m:sSub>
+                          <m:sSubPr>
+                            <m:ctrlPr>
+                              <a:rPr lang="en-US" altLang="ko-KR" b="0" i="1" smtClean="0">
+                                <a:latin typeface="Cambria Math" panose="02040503050406030204" pitchFamily="18" charset="0"/>
+                              </a:rPr>
+                            </m:ctrlPr>
+                          </m:sSubPr>
+                          <m:e>
+                            <m:acc>
+                              <m:accPr>
+                                <m:chr m:val="⃗"/>
+                                <m:ctrlPr>
+                                  <a:rPr lang="en-US" altLang="ko-KR" b="0" i="1" smtClean="0">
+                                    <a:latin typeface="Cambria Math" panose="02040503050406030204" pitchFamily="18" charset="0"/>
+                                  </a:rPr>
+                                </m:ctrlPr>
+                              </m:accPr>
+                              <m:e>
+                                <m:r>
+                                  <a:rPr lang="en-US" altLang="ko-KR" b="0" i="1" smtClean="0">
+                                    <a:latin typeface="Cambria Math" panose="02040503050406030204" pitchFamily="18" charset="0"/>
+                                  </a:rPr>
+                                  <m:t>𝑎</m:t>
+                                </m:r>
+                              </m:e>
+                            </m:acc>
+                          </m:e>
+                          <m:sub>
+                            <m:r>
+                              <a:rPr lang="en-US" altLang="ko-KR" b="0" i="1" smtClean="0">
+                                <a:latin typeface="Cambria Math" panose="02040503050406030204" pitchFamily="18" charset="0"/>
+                              </a:rPr>
+                              <m:t>2</m:t>
+                            </m:r>
+                          </m:sub>
+                        </m:sSub>
+                      </m:oMath>
+                    </m:oMathPara>
+                  </a14:m>
+                  <a:endParaRPr lang="ko-KR" altLang="en-US" dirty="0"/>
+                </a:p>
+              </p:txBody>
+            </p:sp>
+          </mc:Choice>
+          <mc:Fallback>
+            <p:sp>
+              <p:nvSpPr>
+                <p:cNvPr id="16" name="TextBox 15">
+                  <a:extLst>
+                    <a:ext uri="{FF2B5EF4-FFF2-40B4-BE49-F238E27FC236}">
+                      <a16:creationId xmlns:a16="http://schemas.microsoft.com/office/drawing/2014/main" id="{C4C34268-5B91-4420-AA04-5B742119DD80}"/>
+                    </a:ext>
+                  </a:extLst>
+                </p:cNvPr>
+                <p:cNvSpPr txBox="1">
+                  <a:spLocks noRot="1" noChangeAspect="1" noMove="1" noResize="1" noEditPoints="1" noAdjustHandles="1" noChangeArrowheads="1" noChangeShapeType="1" noTextEdit="1"/>
+                </p:cNvSpPr>
+                <p:nvPr/>
+              </p:nvSpPr>
+              <p:spPr>
+                <a:xfrm rot="660000">
+                  <a:off x="4521970" y="1436186"/>
+                  <a:ext cx="1891159" cy="410305"/>
+                </a:xfrm>
+                <a:prstGeom prst="rect">
+                  <a:avLst/>
+                </a:prstGeom>
+                <a:blipFill>
+                  <a:blip r:embed="rId4"/>
+                  <a:stretch>
+                    <a:fillRect r="-7233" b="-1587"/>
+                  </a:stretch>
+                </a:blipFill>
+              </p:spPr>
+              <p:txBody>
+                <a:bodyPr/>
+                <a:lstStyle/>
+                <a:p>
+                  <a:r>
+                    <a:rPr lang="ko-KR" altLang="en-US">
+                      <a:noFill/>
+                    </a:rPr>
+                    <a:t> </a:t>
+                  </a:r>
+                </a:p>
+              </p:txBody>
+            </p:sp>
+          </mc:Fallback>
+        </mc:AlternateContent>
+        <mc:AlternateContent xmlns:mc="http://schemas.openxmlformats.org/markup-compatibility/2006">
+          <mc:Choice xmlns:a14="http://schemas.microsoft.com/office/drawing/2010/main" Requires="a14">
+            <p:sp>
+              <p:nvSpPr>
+                <p:cNvPr id="21" name="직사각형 20">
+                  <a:extLst>
+                    <a:ext uri="{FF2B5EF4-FFF2-40B4-BE49-F238E27FC236}">
+                      <a16:creationId xmlns:a16="http://schemas.microsoft.com/office/drawing/2014/main" id="{CB54C4FA-DCE3-48CD-87A2-342E685988EF}"/>
+                    </a:ext>
+                  </a:extLst>
+                </p:cNvPr>
+                <p:cNvSpPr/>
+                <p:nvPr/>
+              </p:nvSpPr>
+              <p:spPr>
+                <a:xfrm>
+                  <a:off x="4174876" y="2073462"/>
+                  <a:ext cx="396519" cy="410305"/>
+                </a:xfrm>
+                <a:prstGeom prst="rect">
+                  <a:avLst/>
+                </a:prstGeom>
+              </p:spPr>
+              <p:txBody>
+                <a:bodyPr wrap="none">
+                  <a:spAutoFit/>
+                </a:bodyPr>
+                <a:lstStyle/>
+                <a:p>
+                  <a14:m>
+                    <m:oMathPara xmlns:m="http://schemas.openxmlformats.org/officeDocument/2006/math">
+                      <m:oMathParaPr>
+                        <m:jc m:val="centerGroup"/>
+                      </m:oMathParaPr>
+                      <m:oMath xmlns:m="http://schemas.openxmlformats.org/officeDocument/2006/math">
+                        <m:acc>
+                          <m:accPr>
+                            <m:chr m:val="⃗"/>
+                            <m:ctrlPr>
+                              <a:rPr lang="en-US" altLang="ko-KR" i="1">
+                                <a:latin typeface="Cambria Math" panose="02040503050406030204" pitchFamily="18" charset="0"/>
+                              </a:rPr>
+                            </m:ctrlPr>
+                          </m:accPr>
+                          <m:e>
+                            <m:r>
+                              <a:rPr lang="en-US" altLang="ko-KR" i="1">
+                                <a:latin typeface="Cambria Math" panose="02040503050406030204" pitchFamily="18" charset="0"/>
+                              </a:rPr>
+                              <m:t>𝑏</m:t>
+                            </m:r>
+                          </m:e>
+                        </m:acc>
+                      </m:oMath>
+                    </m:oMathPara>
+                  </a14:m>
+                  <a:endParaRPr lang="ko-KR" altLang="en-US" dirty="0"/>
+                </a:p>
+              </p:txBody>
+            </p:sp>
+          </mc:Choice>
+          <mc:Fallback>
+            <p:sp>
+              <p:nvSpPr>
+                <p:cNvPr id="21" name="직사각형 20">
+                  <a:extLst>
+                    <a:ext uri="{FF2B5EF4-FFF2-40B4-BE49-F238E27FC236}">
+                      <a16:creationId xmlns:a16="http://schemas.microsoft.com/office/drawing/2014/main" id="{CB54C4FA-DCE3-48CD-87A2-342E685988EF}"/>
+                    </a:ext>
+                  </a:extLst>
+                </p:cNvPr>
+                <p:cNvSpPr>
+                  <a:spLocks noRot="1" noChangeAspect="1" noMove="1" noResize="1" noEditPoints="1" noAdjustHandles="1" noChangeArrowheads="1" noChangeShapeType="1" noTextEdit="1"/>
+                </p:cNvSpPr>
+                <p:nvPr/>
+              </p:nvSpPr>
+              <p:spPr>
+                <a:xfrm>
+                  <a:off x="4174876" y="2073462"/>
+                  <a:ext cx="396519" cy="410305"/>
+                </a:xfrm>
+                <a:prstGeom prst="rect">
+                  <a:avLst/>
+                </a:prstGeom>
+                <a:blipFill>
+                  <a:blip r:embed="rId5"/>
+                  <a:stretch>
+                    <a:fillRect/>
+                  </a:stretch>
+                </a:blipFill>
+              </p:spPr>
+              <p:txBody>
+                <a:bodyPr/>
+                <a:lstStyle/>
+                <a:p>
+                  <a:r>
+                    <a:rPr lang="ko-KR" altLang="en-US">
+                      <a:noFill/>
+                    </a:rPr>
+                    <a:t> </a:t>
+                  </a:r>
+                </a:p>
+              </p:txBody>
+            </p:sp>
+          </mc:Fallback>
+        </mc:AlternateContent>
+      </p:grpSp>
+    </p:spTree>
+    <p:extLst>
+      <p:ext uri="{BB962C8B-B14F-4D97-AF65-F5344CB8AC3E}">
+        <p14:creationId xmlns:p14="http://schemas.microsoft.com/office/powerpoint/2010/main" val="1880420241"/>
+      </p:ext>
+    </p:extLst>
+  </p:cSld>
+  <p:clrMapOvr>
+    <a:masterClrMapping/>
+  </p:clrMapOvr>
+</p:sld>
+</file>
+
+<file path=ppt/slides/slide2.xml><?xml version="1.0" encoding="utf-8"?>
+<p:sld xmlns:a="http://schemas.openxmlformats.org/drawingml/2006/main" xmlns:r="http://schemas.openxmlformats.org/officeDocument/2006/relationships" xmlns:p="http://schemas.openxmlformats.org/presentationml/2006/main">
+  <p:cSld>
+    <p:spTree>
+      <p:nvGrpSpPr>
+        <p:cNvPr id="1" name=""/>
+        <p:cNvGrpSpPr/>
+        <p:nvPr/>
+      </p:nvGrpSpPr>
+      <p:grpSpPr>
+        <a:xfrm>
+          <a:off x="0" y="0"/>
+          <a:ext cx="0" cy="0"/>
+          <a:chOff x="0" y="0"/>
+          <a:chExt cx="0" cy="0"/>
+        </a:xfrm>
+      </p:grpSpPr>
       <p:sp>
         <p:nvSpPr>
           <p:cNvPr id="9" name="자유형 8"/>
@@ -3149,9 +4080,6 @@
             <a:avLst/>
           </a:prstGeom>
           <a:ln w="28575">
-            <a:solidFill>
-              <a:schemeClr val="accent6"/>
-            </a:solidFill>
             <a:tailEnd type="arrow"/>
           </a:ln>
         </p:spPr>
@@ -3188,7 +4116,7 @@
           </a:prstGeom>
           <a:ln w="28575">
             <a:solidFill>
-              <a:schemeClr val="accent1"/>
+              <a:schemeClr val="accent6"/>
             </a:solidFill>
             <a:tailEnd type="arrow"/>
           </a:ln>
@@ -3420,14 +4348,14 @@
           </a:p>
         </p:txBody>
       </p:sp>
-      <mc:AlternateContent xmlns:mc="http://schemas.openxmlformats.org/markup-compatibility/2006">
-        <mc:Choice xmlns:a14="http://schemas.microsoft.com/office/drawing/2010/main" Requires="a14">
+      <mc:AlternateContent xmlns:mc="http://schemas.openxmlformats.org/markup-compatibility/2006" xmlns:a14="http://schemas.microsoft.com/office/drawing/2010/main">
+        <mc:Choice Requires="a14">
           <p:sp>
             <p:nvSpPr>
               <p:cNvPr id="2" name="TextBox 1">
                 <a:extLst>
                   <a:ext uri="{FF2B5EF4-FFF2-40B4-BE49-F238E27FC236}">
-                    <a16:creationId xmlns:a16="http://schemas.microsoft.com/office/drawing/2014/main" xmlns="" id="{DAC7E6F0-9276-4F03-9EE2-565FA8BBCE3F}"/>
+                    <a16:creationId xmlns:a16="http://schemas.microsoft.com/office/drawing/2014/main" id="{DAC7E6F0-9276-4F03-9EE2-565FA8BBCE3F}"/>
                   </a:ext>
                 </a:extLst>
               </p:cNvPr>
@@ -3437,7 +4365,7 @@
             <p:spPr>
               <a:xfrm>
                 <a:off x="5155446" y="3745674"/>
-                <a:ext cx="501996" cy="369332"/>
+                <a:ext cx="496674" cy="369332"/>
               </a:xfrm>
               <a:prstGeom prst="rect">
                 <a:avLst/>
@@ -3461,7 +4389,7 @@
                         <m:sSubPr>
                           <m:ctrlPr>
                             <a:rPr lang="en-US" altLang="ko-KR" b="0" i="1" smtClean="0">
-                              <a:latin typeface="Cambria Math"/>
+                              <a:latin typeface="Cambria Math" panose="02040503050406030204" pitchFamily="18" charset="0"/>
                             </a:rPr>
                           </m:ctrlPr>
                         </m:sSubPr>
@@ -3471,7 +4399,7 @@
                               <m:chr m:val="⃗"/>
                               <m:ctrlPr>
                                 <a:rPr lang="en-US" altLang="ko-KR" b="0" i="1" smtClean="0">
-                                  <a:latin typeface="Cambria Math"/>
+                                  <a:latin typeface="Cambria Math" panose="02040503050406030204" pitchFamily="18" charset="0"/>
                                 </a:rPr>
                               </m:ctrlPr>
                             </m:accPr>
@@ -3488,9 +4416,9 @@
                         <m:sub>
                           <m:r>
                             <a:rPr lang="en-US" altLang="ko-KR" b="0" i="1" smtClean="0">
-                              <a:latin typeface="Cambria Math"/>
+                              <a:latin typeface="Cambria Math" panose="02040503050406030204" pitchFamily="18" charset="0"/>
                             </a:rPr>
-                            <m:t>2</m:t>
+                            <m:t>1</m:t>
                           </m:r>
                         </m:sub>
                       </m:sSub>
@@ -3502,13 +4430,13 @@
             </p:txBody>
           </p:sp>
         </mc:Choice>
-        <mc:Fallback>
+        <mc:Fallback xmlns="">
           <p:sp>
             <p:nvSpPr>
               <p:cNvPr id="2" name="TextBox 1">
                 <a:extLst>
                   <a:ext uri="{FF2B5EF4-FFF2-40B4-BE49-F238E27FC236}">
-                    <a16:creationId xmlns:a16="http://schemas.microsoft.com/office/drawing/2014/main" xmlns:a14="http://schemas.microsoft.com/office/drawing/2010/main" xmlns="" id="{DAC7E6F0-9276-4F03-9EE2-565FA8BBCE3F}"/>
+                    <a16:creationId xmlns:a16="http://schemas.microsoft.com/office/drawing/2014/main" id="{DAC7E6F0-9276-4F03-9EE2-565FA8BBCE3F}"/>
                   </a:ext>
                 </a:extLst>
               </p:cNvPr>
@@ -3520,15 +4448,15 @@
             <p:spPr>
               <a:xfrm>
                 <a:off x="5155446" y="3745674"/>
-                <a:ext cx="501996" cy="369332"/>
+                <a:ext cx="496674" cy="369332"/>
               </a:xfrm>
               <a:prstGeom prst="rect">
                 <a:avLst/>
               </a:prstGeom>
-              <a:blipFill rotWithShape="1">
+              <a:blipFill>
                 <a:blip r:embed="rId2"/>
                 <a:stretch>
-                  <a:fillRect t="-19672" r="-21951" b="-1639"/>
+                  <a:fillRect t="-19672" r="-22222" b="-1639"/>
                 </a:stretch>
               </a:blipFill>
             </p:spPr>
@@ -3547,14 +4475,14 @@
           </p:sp>
         </mc:Fallback>
       </mc:AlternateContent>
-      <mc:AlternateContent xmlns:mc="http://schemas.openxmlformats.org/markup-compatibility/2006">
-        <mc:Choice xmlns:a14="http://schemas.microsoft.com/office/drawing/2010/main" Requires="a14">
+      <mc:AlternateContent xmlns:mc="http://schemas.openxmlformats.org/markup-compatibility/2006" xmlns:a14="http://schemas.microsoft.com/office/drawing/2010/main">
+        <mc:Choice Requires="a14">
           <p:sp>
             <p:nvSpPr>
               <p:cNvPr id="12" name="TextBox 11">
                 <a:extLst>
                   <a:ext uri="{FF2B5EF4-FFF2-40B4-BE49-F238E27FC236}">
-                    <a16:creationId xmlns:a16="http://schemas.microsoft.com/office/drawing/2014/main" xmlns="" id="{83EA6CDE-D8B1-4CB8-A3DA-AAB3CDBF821A}"/>
+                    <a16:creationId xmlns:a16="http://schemas.microsoft.com/office/drawing/2014/main" id="{83EA6CDE-D8B1-4CB8-A3DA-AAB3CDBF821A}"/>
                   </a:ext>
                 </a:extLst>
               </p:cNvPr>
@@ -3588,7 +4516,7 @@
                         <m:sSubPr>
                           <m:ctrlPr>
                             <a:rPr lang="en-US" altLang="ko-KR" b="0" i="1" smtClean="0">
-                              <a:latin typeface="Cambria Math"/>
+                              <a:latin typeface="Cambria Math" panose="02040503050406030204" pitchFamily="18" charset="0"/>
                             </a:rPr>
                           </m:ctrlPr>
                         </m:sSubPr>
@@ -3598,7 +4526,7 @@
                               <m:chr m:val="⃗"/>
                               <m:ctrlPr>
                                 <a:rPr lang="en-US" altLang="ko-KR" b="0" i="1" smtClean="0">
-                                  <a:latin typeface="Cambria Math"/>
+                                  <a:latin typeface="Cambria Math" panose="02040503050406030204" pitchFamily="18" charset="0"/>
                                 </a:rPr>
                               </m:ctrlPr>
                             </m:accPr>
@@ -3615,9 +4543,9 @@
                         <m:sub>
                           <m:r>
                             <a:rPr lang="en-US" altLang="ko-KR" b="0" i="1" smtClean="0">
-                              <a:latin typeface="Cambria Math"/>
+                              <a:latin typeface="Cambria Math" panose="02040503050406030204" pitchFamily="18" charset="0"/>
                             </a:rPr>
-                            <m:t>1</m:t>
+                            <m:t>2</m:t>
                           </m:r>
                         </m:sub>
                       </m:sSub>
@@ -3629,13 +4557,13 @@
             </p:txBody>
           </p:sp>
         </mc:Choice>
-        <mc:Fallback>
+        <mc:Fallback xmlns="">
           <p:sp>
             <p:nvSpPr>
               <p:cNvPr id="12" name="TextBox 11">
                 <a:extLst>
                   <a:ext uri="{FF2B5EF4-FFF2-40B4-BE49-F238E27FC236}">
-                    <a16:creationId xmlns:a16="http://schemas.microsoft.com/office/drawing/2014/main" xmlns:a14="http://schemas.microsoft.com/office/drawing/2010/main" xmlns="" id="{83EA6CDE-D8B1-4CB8-A3DA-AAB3CDBF821A}"/>
+                    <a16:creationId xmlns:a16="http://schemas.microsoft.com/office/drawing/2014/main" id="{83EA6CDE-D8B1-4CB8-A3DA-AAB3CDBF821A}"/>
                   </a:ext>
                 </a:extLst>
               </p:cNvPr>
@@ -3652,7 +4580,7 @@
               <a:prstGeom prst="rect">
                 <a:avLst/>
               </a:prstGeom>
-              <a:blipFill rotWithShape="1">
+              <a:blipFill>
                 <a:blip r:embed="rId3"/>
                 <a:stretch>
                   <a:fillRect t="-20000" r="-21687" b="-3333"/>
@@ -3681,7 +4609,7 @@
               <p:cNvPr id="15" name="TextBox 14">
                 <a:extLst>
                   <a:ext uri="{FF2B5EF4-FFF2-40B4-BE49-F238E27FC236}">
-                    <a16:creationId xmlns:a16="http://schemas.microsoft.com/office/drawing/2014/main" xmlns="" id="{9E686680-3D0D-4145-81F8-AF3A457B1DEF}"/>
+                    <a16:creationId xmlns:a16="http://schemas.microsoft.com/office/drawing/2014/main" id="{9E686680-3D0D-4145-81F8-AF3A457B1DEF}"/>
                   </a:ext>
                 </a:extLst>
               </p:cNvPr>
@@ -3716,7 +4644,7 @@
                           <m:chr m:val="⃗"/>
                           <m:ctrlPr>
                             <a:rPr lang="en-US" altLang="ko-KR" b="0" i="1" smtClean="0">
-                              <a:latin typeface="Cambria Math"/>
+                              <a:latin typeface="Cambria Math" panose="02040503050406030204" pitchFamily="18" charset="0"/>
                             </a:rPr>
                           </m:ctrlPr>
                         </m:accPr>
@@ -3789,7 +4717,7 @@
               <p:cNvPr id="17" name="TextBox 16">
                 <a:extLst>
                   <a:ext uri="{FF2B5EF4-FFF2-40B4-BE49-F238E27FC236}">
-                    <a16:creationId xmlns:a16="http://schemas.microsoft.com/office/drawing/2014/main" xmlns="" id="{E04FC533-E85C-4D00-8D86-E283FD3FD216}"/>
+                    <a16:creationId xmlns:a16="http://schemas.microsoft.com/office/drawing/2014/main" id="{E04FC533-E85C-4D00-8D86-E283FD3FD216}"/>
                   </a:ext>
                 </a:extLst>
               </p:cNvPr>
@@ -3842,7 +4770,7 @@
                           <m:chr m:val="̂"/>
                           <m:ctrlPr>
                             <a:rPr lang="en-US" altLang="ko-KR" b="0" i="1" smtClean="0">
-                              <a:latin typeface="Cambria Math"/>
+                              <a:latin typeface="Cambria Math" panose="02040503050406030204" pitchFamily="18" charset="0"/>
                             </a:rPr>
                           </m:ctrlPr>
                         </m:accPr>
@@ -3913,7 +4841,7 @@
           <p:cNvPr id="3" name="자유형: 도형 2">
             <a:extLst>
               <a:ext uri="{FF2B5EF4-FFF2-40B4-BE49-F238E27FC236}">
-                <a16:creationId xmlns:a16="http://schemas.microsoft.com/office/drawing/2014/main" xmlns="" id="{2B505BF8-318C-498F-B4D1-D9C45876A24C}"/>
+                <a16:creationId xmlns:a16="http://schemas.microsoft.com/office/drawing/2014/main" id="{2B505BF8-318C-498F-B4D1-D9C45876A24C}"/>
               </a:ext>
             </a:extLst>
           </p:cNvPr>
@@ -4017,7 +4945,7 @@
               <p:cNvPr id="18" name="TextBox 17">
                 <a:extLst>
                   <a:ext uri="{FF2B5EF4-FFF2-40B4-BE49-F238E27FC236}">
-                    <a16:creationId xmlns:a16="http://schemas.microsoft.com/office/drawing/2014/main" xmlns="" id="{04D53F16-1B28-4E99-A385-214F85D9B350}"/>
+                    <a16:creationId xmlns:a16="http://schemas.microsoft.com/office/drawing/2014/main" id="{04D53F16-1B28-4E99-A385-214F85D9B350}"/>
                   </a:ext>
                 </a:extLst>
               </p:cNvPr>
@@ -4052,7 +4980,7 @@
                           <m:chr m:val="⃗"/>
                           <m:ctrlPr>
                             <a:rPr lang="en-US" altLang="ko-KR" b="0" i="1" smtClean="0">
-                              <a:latin typeface="Cambria Math"/>
+                              <a:latin typeface="Cambria Math" panose="02040503050406030204" pitchFamily="18" charset="0"/>
                             </a:rPr>
                           </m:ctrlPr>
                         </m:accPr>
@@ -4076,7 +5004,7 @@
                           <m:chr m:val="⃗"/>
                           <m:ctrlPr>
                             <a:rPr lang="en-US" altLang="ko-KR" b="0" i="1" smtClean="0">
-                              <a:latin typeface="Cambria Math"/>
+                              <a:latin typeface="Cambria Math" panose="02040503050406030204" pitchFamily="18" charset="0"/>
                             </a:rPr>
                           </m:ctrlPr>
                         </m:accPr>
@@ -4100,7 +5028,7 @@
                           <m:chr m:val="⃗"/>
                           <m:ctrlPr>
                             <a:rPr lang="en-US" altLang="ko-KR" b="0" i="1" smtClean="0">
-                              <a:latin typeface="Cambria Math"/>
+                              <a:latin typeface="Cambria Math" panose="02040503050406030204" pitchFamily="18" charset="0"/>
                             </a:rPr>
                           </m:ctrlPr>
                         </m:accPr>

</xml_diff>

<commit_message>
gradient descent pic 13 까지 upload
</commit_message>
<xml_diff>
--- a/pics/2020-08-24-linear_regression/pics.pptx
+++ b/pics/2020-08-24-linear_regression/pics.pptx
@@ -10,6 +10,8 @@
     <p:sldId id="256" r:id="rId4"/>
     <p:sldId id="259" r:id="rId5"/>
     <p:sldId id="260" r:id="rId6"/>
+    <p:sldId id="261" r:id="rId7"/>
+    <p:sldId id="262" r:id="rId8"/>
   </p:sldIdLst>
   <p:sldSz cx="9144000" cy="6858000" type="screen4x3"/>
   <p:notesSz cx="6858000" cy="9144000"/>
@@ -7637,6 +7639,1489 @@
 </p:sld>
 </file>
 
+<file path=ppt/slides/slide6.xml><?xml version="1.0" encoding="utf-8"?>
+<p:sld xmlns:a="http://schemas.openxmlformats.org/drawingml/2006/main" xmlns:r="http://schemas.openxmlformats.org/officeDocument/2006/relationships" xmlns:p="http://schemas.openxmlformats.org/presentationml/2006/main">
+  <p:cSld>
+    <p:spTree>
+      <p:nvGrpSpPr>
+        <p:cNvPr id="1" name=""/>
+        <p:cNvGrpSpPr/>
+        <p:nvPr/>
+      </p:nvGrpSpPr>
+      <p:grpSpPr>
+        <a:xfrm>
+          <a:off x="0" y="0"/>
+          <a:ext cx="0" cy="0"/>
+          <a:chOff x="0" y="0"/>
+          <a:chExt cx="0" cy="0"/>
+        </a:xfrm>
+      </p:grpSpPr>
+      <p:pic>
+        <p:nvPicPr>
+          <p:cNvPr id="4" name="그림 3">
+            <a:extLst>
+              <a:ext uri="{FF2B5EF4-FFF2-40B4-BE49-F238E27FC236}">
+                <a16:creationId xmlns:a16="http://schemas.microsoft.com/office/drawing/2014/main" id="{10E61BF7-6D64-4BCA-8C7D-B78E0F7B967E}"/>
+              </a:ext>
+            </a:extLst>
+          </p:cNvPr>
+          <p:cNvPicPr>
+            <a:picLocks noChangeAspect="1"/>
+          </p:cNvPicPr>
+          <p:nvPr/>
+        </p:nvPicPr>
+        <p:blipFill>
+          <a:blip r:embed="rId2"/>
+          <a:stretch>
+            <a:fillRect/>
+          </a:stretch>
+        </p:blipFill>
+        <p:spPr>
+          <a:xfrm>
+            <a:off x="716086" y="548680"/>
+            <a:ext cx="7711828" cy="5760640"/>
+          </a:xfrm>
+          <a:prstGeom prst="rect">
+            <a:avLst/>
+          </a:prstGeom>
+        </p:spPr>
+      </p:pic>
+      <p:cxnSp>
+        <p:nvCxnSpPr>
+          <p:cNvPr id="12" name="직선 연결선 11">
+            <a:extLst>
+              <a:ext uri="{FF2B5EF4-FFF2-40B4-BE49-F238E27FC236}">
+                <a16:creationId xmlns:a16="http://schemas.microsoft.com/office/drawing/2014/main" id="{3C0D22A7-5056-43D8-9F61-92D5B60D8357}"/>
+              </a:ext>
+            </a:extLst>
+          </p:cNvPr>
+          <p:cNvCxnSpPr/>
+          <p:nvPr/>
+        </p:nvCxnSpPr>
+        <p:spPr>
+          <a:xfrm>
+            <a:off x="6516216" y="2472322"/>
+            <a:ext cx="525235" cy="0"/>
+          </a:xfrm>
+          <a:prstGeom prst="line">
+            <a:avLst/>
+          </a:prstGeom>
+          <a:ln w="28575">
+            <a:solidFill>
+              <a:schemeClr val="tx1"/>
+            </a:solidFill>
+            <a:prstDash val="sysDot"/>
+          </a:ln>
+        </p:spPr>
+        <p:style>
+          <a:lnRef idx="1">
+            <a:schemeClr val="accent1"/>
+          </a:lnRef>
+          <a:fillRef idx="0">
+            <a:schemeClr val="accent1"/>
+          </a:fillRef>
+          <a:effectRef idx="0">
+            <a:schemeClr val="accent1"/>
+          </a:effectRef>
+          <a:fontRef idx="minor">
+            <a:schemeClr val="tx1"/>
+          </a:fontRef>
+        </p:style>
+      </p:cxnSp>
+      <p:cxnSp>
+        <p:nvCxnSpPr>
+          <p:cNvPr id="14" name="직선 연결선 13">
+            <a:extLst>
+              <a:ext uri="{FF2B5EF4-FFF2-40B4-BE49-F238E27FC236}">
+                <a16:creationId xmlns:a16="http://schemas.microsoft.com/office/drawing/2014/main" id="{D2DC401C-19B7-44FC-9979-3F25008A6CF6}"/>
+              </a:ext>
+            </a:extLst>
+          </p:cNvPr>
+          <p:cNvCxnSpPr>
+            <a:cxnSpLocks/>
+          </p:cNvCxnSpPr>
+          <p:nvPr/>
+        </p:nvCxnSpPr>
+        <p:spPr>
+          <a:xfrm flipV="1">
+            <a:off x="7041451" y="1268760"/>
+            <a:ext cx="0" cy="1203562"/>
+          </a:xfrm>
+          <a:prstGeom prst="line">
+            <a:avLst/>
+          </a:prstGeom>
+          <a:ln w="28575">
+            <a:solidFill>
+              <a:schemeClr val="tx1"/>
+            </a:solidFill>
+            <a:prstDash val="sysDot"/>
+          </a:ln>
+        </p:spPr>
+        <p:style>
+          <a:lnRef idx="1">
+            <a:schemeClr val="accent1"/>
+          </a:lnRef>
+          <a:fillRef idx="0">
+            <a:schemeClr val="accent1"/>
+          </a:fillRef>
+          <a:effectRef idx="0">
+            <a:schemeClr val="accent1"/>
+          </a:effectRef>
+          <a:fontRef idx="minor">
+            <a:schemeClr val="tx1"/>
+          </a:fontRef>
+        </p:style>
+      </p:cxnSp>
+      <p:cxnSp>
+        <p:nvCxnSpPr>
+          <p:cNvPr id="6" name="직선 화살표 연결선 5">
+            <a:extLst>
+              <a:ext uri="{FF2B5EF4-FFF2-40B4-BE49-F238E27FC236}">
+                <a16:creationId xmlns:a16="http://schemas.microsoft.com/office/drawing/2014/main" id="{31E02640-3ED4-4F61-B737-2EF5C1DB1C39}"/>
+              </a:ext>
+            </a:extLst>
+          </p:cNvPr>
+          <p:cNvCxnSpPr>
+            <a:cxnSpLocks/>
+          </p:cNvCxnSpPr>
+          <p:nvPr/>
+        </p:nvCxnSpPr>
+        <p:spPr>
+          <a:xfrm flipV="1">
+            <a:off x="6516216" y="1196752"/>
+            <a:ext cx="525235" cy="1275570"/>
+          </a:xfrm>
+          <a:prstGeom prst="straightConnector1">
+            <a:avLst/>
+          </a:prstGeom>
+          <a:ln w="57150">
+            <a:solidFill>
+              <a:srgbClr val="FF0000"/>
+            </a:solidFill>
+            <a:tailEnd type="triangle"/>
+          </a:ln>
+        </p:spPr>
+        <p:style>
+          <a:lnRef idx="1">
+            <a:schemeClr val="accent1"/>
+          </a:lnRef>
+          <a:fillRef idx="0">
+            <a:schemeClr val="accent1"/>
+          </a:fillRef>
+          <a:effectRef idx="0">
+            <a:schemeClr val="accent1"/>
+          </a:effectRef>
+          <a:fontRef idx="minor">
+            <a:schemeClr val="tx1"/>
+          </a:fontRef>
+        </p:style>
+      </p:cxnSp>
+      <p:sp>
+        <p:nvSpPr>
+          <p:cNvPr id="16" name="타원 15">
+            <a:extLst>
+              <a:ext uri="{FF2B5EF4-FFF2-40B4-BE49-F238E27FC236}">
+                <a16:creationId xmlns:a16="http://schemas.microsoft.com/office/drawing/2014/main" id="{32D03930-9FCF-4D8B-87ED-F30EDB5C7172}"/>
+              </a:ext>
+            </a:extLst>
+          </p:cNvPr>
+          <p:cNvSpPr/>
+          <p:nvPr/>
+        </p:nvSpPr>
+        <p:spPr>
+          <a:xfrm>
+            <a:off x="6444206" y="2400314"/>
+            <a:ext cx="144018" cy="144018"/>
+          </a:xfrm>
+          <a:prstGeom prst="ellipse">
+            <a:avLst/>
+          </a:prstGeom>
+          <a:solidFill>
+            <a:schemeClr val="tx1"/>
+          </a:solidFill>
+          <a:ln>
+            <a:noFill/>
+          </a:ln>
+        </p:spPr>
+        <p:style>
+          <a:lnRef idx="2">
+            <a:schemeClr val="accent1">
+              <a:shade val="50000"/>
+            </a:schemeClr>
+          </a:lnRef>
+          <a:fillRef idx="1">
+            <a:schemeClr val="accent1"/>
+          </a:fillRef>
+          <a:effectRef idx="0">
+            <a:schemeClr val="accent1"/>
+          </a:effectRef>
+          <a:fontRef idx="minor">
+            <a:schemeClr val="lt1"/>
+          </a:fontRef>
+        </p:style>
+        <p:txBody>
+          <a:bodyPr rtlCol="0" anchor="ctr"/>
+          <a:lstStyle/>
+          <a:p>
+            <a:pPr algn="ctr"/>
+            <a:endParaRPr lang="ko-KR" altLang="en-US"/>
+          </a:p>
+        </p:txBody>
+      </p:sp>
+      <p:sp>
+        <p:nvSpPr>
+          <p:cNvPr id="18" name="TextBox 17">
+            <a:extLst>
+              <a:ext uri="{FF2B5EF4-FFF2-40B4-BE49-F238E27FC236}">
+                <a16:creationId xmlns:a16="http://schemas.microsoft.com/office/drawing/2014/main" id="{E2645862-4FE8-47BA-B75C-ED42449A68DD}"/>
+              </a:ext>
+            </a:extLst>
+          </p:cNvPr>
+          <p:cNvSpPr txBox="1"/>
+          <p:nvPr/>
+        </p:nvSpPr>
+        <p:spPr>
+          <a:xfrm>
+            <a:off x="4471344" y="2186787"/>
+            <a:ext cx="1936857" cy="715089"/>
+          </a:xfrm>
+          <a:prstGeom prst="roundRect">
+            <a:avLst/>
+          </a:prstGeom>
+          <a:solidFill>
+            <a:schemeClr val="bg1"/>
+          </a:solidFill>
+          <a:ln>
+            <a:solidFill>
+              <a:schemeClr val="tx1"/>
+            </a:solidFill>
+          </a:ln>
+        </p:spPr>
+        <p:txBody>
+          <a:bodyPr wrap="none" rtlCol="0">
+            <a:spAutoFit/>
+          </a:bodyPr>
+          <a:lstStyle/>
+          <a:p>
+            <a:pPr algn="ctr"/>
+            <a:r>
+              <a:rPr lang="ko-KR" altLang="en-US" dirty="0"/>
+              <a:t>랜덤하게 배정된</a:t>
+            </a:r>
+            <a:endParaRPr lang="en-US" altLang="ko-KR" dirty="0"/>
+          </a:p>
+          <a:p>
+            <a:pPr algn="ctr"/>
+            <a:r>
+              <a:rPr lang="ko-KR" altLang="en-US" dirty="0"/>
+              <a:t>시작 포인트</a:t>
+            </a:r>
+          </a:p>
+        </p:txBody>
+      </p:sp>
+      <mc:AlternateContent xmlns:mc="http://schemas.openxmlformats.org/markup-compatibility/2006" xmlns:a14="http://schemas.microsoft.com/office/drawing/2010/main">
+        <mc:Choice Requires="a14">
+          <p:sp>
+            <p:nvSpPr>
+              <p:cNvPr id="19" name="TextBox 18">
+                <a:extLst>
+                  <a:ext uri="{FF2B5EF4-FFF2-40B4-BE49-F238E27FC236}">
+                    <a16:creationId xmlns:a16="http://schemas.microsoft.com/office/drawing/2014/main" id="{1EF1E73A-A1A2-46CC-B9EE-557B44FF9837}"/>
+                  </a:ext>
+                </a:extLst>
+              </p:cNvPr>
+              <p:cNvSpPr txBox="1"/>
+              <p:nvPr/>
+            </p:nvSpPr>
+            <p:spPr>
+              <a:xfrm>
+                <a:off x="5788433" y="375186"/>
+                <a:ext cx="1980800" cy="684868"/>
+              </a:xfrm>
+              <a:prstGeom prst="roundRect">
+                <a:avLst/>
+              </a:prstGeom>
+              <a:solidFill>
+                <a:schemeClr val="bg1"/>
+              </a:solidFill>
+              <a:ln w="28575">
+                <a:solidFill>
+                  <a:srgbClr val="FF0000"/>
+                </a:solidFill>
+              </a:ln>
+            </p:spPr>
+            <p:txBody>
+              <a:bodyPr wrap="none" rtlCol="0">
+                <a:spAutoFit/>
+              </a:bodyPr>
+              <a:lstStyle/>
+              <a:p>
+                <a:pPr algn="ctr"/>
+                <a14:m>
+                  <m:oMathPara xmlns:m="http://schemas.openxmlformats.org/officeDocument/2006/math">
+                    <m:oMathParaPr>
+                      <m:jc m:val="centerGroup"/>
+                    </m:oMathParaPr>
+                    <m:oMath xmlns:m="http://schemas.openxmlformats.org/officeDocument/2006/math">
+                      <m:r>
+                        <m:rPr>
+                          <m:sty m:val="p"/>
+                        </m:rPr>
+                        <a:rPr lang="en-US" altLang="ko-KR" b="0" i="0" smtClean="0">
+                          <a:solidFill>
+                            <a:srgbClr val="FF0000"/>
+                          </a:solidFill>
+                          <a:latin typeface="Cambria Math" panose="02040503050406030204" pitchFamily="18" charset="0"/>
+                        </a:rPr>
+                        <m:t>∇</m:t>
+                      </m:r>
+                      <m:r>
+                        <a:rPr lang="en-US" altLang="ko-KR" b="0" i="1" smtClean="0">
+                          <a:solidFill>
+                            <a:srgbClr val="FF0000"/>
+                          </a:solidFill>
+                          <a:latin typeface="Cambria Math" panose="02040503050406030204" pitchFamily="18" charset="0"/>
+                        </a:rPr>
+                        <m:t>𝑓</m:t>
+                      </m:r>
+                      <m:r>
+                        <a:rPr lang="en-US" altLang="ko-KR" b="0" i="1" smtClean="0">
+                          <a:solidFill>
+                            <a:srgbClr val="FF0000"/>
+                          </a:solidFill>
+                          <a:latin typeface="Cambria Math" panose="02040503050406030204" pitchFamily="18" charset="0"/>
+                        </a:rPr>
+                        <m:t>=</m:t>
+                      </m:r>
+                      <m:f>
+                        <m:fPr>
+                          <m:ctrlPr>
+                            <a:rPr lang="en-US" altLang="ko-KR" i="1">
+                              <a:solidFill>
+                                <a:srgbClr val="FF0000"/>
+                              </a:solidFill>
+                              <a:latin typeface="Cambria Math" panose="02040503050406030204" pitchFamily="18" charset="0"/>
+                            </a:rPr>
+                          </m:ctrlPr>
+                        </m:fPr>
+                        <m:num>
+                          <m:r>
+                            <a:rPr lang="en-US" altLang="ko-KR" i="1">
+                              <a:solidFill>
+                                <a:srgbClr val="FF0000"/>
+                              </a:solidFill>
+                              <a:latin typeface="Cambria Math" panose="02040503050406030204" pitchFamily="18" charset="0"/>
+                            </a:rPr>
+                            <m:t>𝜕</m:t>
+                          </m:r>
+                          <m:r>
+                            <a:rPr lang="en-US" altLang="ko-KR" i="1">
+                              <a:solidFill>
+                                <a:srgbClr val="FF0000"/>
+                              </a:solidFill>
+                              <a:latin typeface="Cambria Math" panose="02040503050406030204" pitchFamily="18" charset="0"/>
+                            </a:rPr>
+                            <m:t>𝑓</m:t>
+                          </m:r>
+                        </m:num>
+                        <m:den>
+                          <m:r>
+                            <a:rPr lang="en-US" altLang="ko-KR" i="1">
+                              <a:solidFill>
+                                <a:srgbClr val="FF0000"/>
+                              </a:solidFill>
+                              <a:latin typeface="Cambria Math" panose="02040503050406030204" pitchFamily="18" charset="0"/>
+                            </a:rPr>
+                            <m:t>𝜕</m:t>
+                          </m:r>
+                          <m:r>
+                            <a:rPr lang="en-US" altLang="ko-KR" i="1">
+                              <a:solidFill>
+                                <a:srgbClr val="FF0000"/>
+                              </a:solidFill>
+                              <a:latin typeface="Cambria Math" panose="02040503050406030204" pitchFamily="18" charset="0"/>
+                            </a:rPr>
+                            <m:t>𝑎</m:t>
+                          </m:r>
+                        </m:den>
+                      </m:f>
+                      <m:acc>
+                        <m:accPr>
+                          <m:chr m:val="̂"/>
+                          <m:ctrlPr>
+                            <a:rPr lang="en-US" altLang="ko-KR" b="0" i="1" smtClean="0">
+                              <a:solidFill>
+                                <a:srgbClr val="FF0000"/>
+                              </a:solidFill>
+                              <a:latin typeface="Cambria Math" panose="02040503050406030204" pitchFamily="18" charset="0"/>
+                            </a:rPr>
+                          </m:ctrlPr>
+                        </m:accPr>
+                        <m:e>
+                          <m:r>
+                            <a:rPr lang="en-US" altLang="ko-KR" b="0" i="1" smtClean="0">
+                              <a:solidFill>
+                                <a:srgbClr val="FF0000"/>
+                              </a:solidFill>
+                              <a:latin typeface="Cambria Math" panose="02040503050406030204" pitchFamily="18" charset="0"/>
+                            </a:rPr>
+                            <m:t>𝑖</m:t>
+                          </m:r>
+                        </m:e>
+                      </m:acc>
+                      <m:r>
+                        <a:rPr lang="en-US" altLang="ko-KR" b="0" i="0" smtClean="0">
+                          <a:solidFill>
+                            <a:srgbClr val="FF0000"/>
+                          </a:solidFill>
+                          <a:latin typeface="Cambria Math" panose="02040503050406030204" pitchFamily="18" charset="0"/>
+                        </a:rPr>
+                        <m:t>+</m:t>
+                      </m:r>
+                      <m:f>
+                        <m:fPr>
+                          <m:ctrlPr>
+                            <a:rPr lang="en-US" altLang="ko-KR" i="1">
+                              <a:solidFill>
+                                <a:srgbClr val="FF0000"/>
+                              </a:solidFill>
+                              <a:latin typeface="Cambria Math" panose="02040503050406030204" pitchFamily="18" charset="0"/>
+                            </a:rPr>
+                          </m:ctrlPr>
+                        </m:fPr>
+                        <m:num>
+                          <m:r>
+                            <a:rPr lang="en-US" altLang="ko-KR" i="1">
+                              <a:solidFill>
+                                <a:srgbClr val="FF0000"/>
+                              </a:solidFill>
+                              <a:latin typeface="Cambria Math" panose="02040503050406030204" pitchFamily="18" charset="0"/>
+                            </a:rPr>
+                            <m:t>𝜕</m:t>
+                          </m:r>
+                          <m:r>
+                            <a:rPr lang="en-US" altLang="ko-KR" i="1">
+                              <a:solidFill>
+                                <a:srgbClr val="FF0000"/>
+                              </a:solidFill>
+                              <a:latin typeface="Cambria Math" panose="02040503050406030204" pitchFamily="18" charset="0"/>
+                            </a:rPr>
+                            <m:t>𝑓</m:t>
+                          </m:r>
+                        </m:num>
+                        <m:den>
+                          <m:r>
+                            <a:rPr lang="en-US" altLang="ko-KR" i="1">
+                              <a:solidFill>
+                                <a:srgbClr val="FF0000"/>
+                              </a:solidFill>
+                              <a:latin typeface="Cambria Math" panose="02040503050406030204" pitchFamily="18" charset="0"/>
+                            </a:rPr>
+                            <m:t>𝜕</m:t>
+                          </m:r>
+                          <m:r>
+                            <a:rPr lang="en-US" altLang="ko-KR" i="1">
+                              <a:solidFill>
+                                <a:srgbClr val="FF0000"/>
+                              </a:solidFill>
+                              <a:latin typeface="Cambria Math" panose="02040503050406030204" pitchFamily="18" charset="0"/>
+                            </a:rPr>
+                            <m:t>𝑏</m:t>
+                          </m:r>
+                        </m:den>
+                      </m:f>
+                      <m:acc>
+                        <m:accPr>
+                          <m:chr m:val="̂"/>
+                          <m:ctrlPr>
+                            <a:rPr lang="en-US" altLang="ko-KR" b="0" i="1" smtClean="0">
+                              <a:solidFill>
+                                <a:srgbClr val="FF0000"/>
+                              </a:solidFill>
+                              <a:latin typeface="Cambria Math" panose="02040503050406030204" pitchFamily="18" charset="0"/>
+                            </a:rPr>
+                          </m:ctrlPr>
+                        </m:accPr>
+                        <m:e>
+                          <m:r>
+                            <a:rPr lang="en-US" altLang="ko-KR" b="0" i="1" smtClean="0">
+                              <a:solidFill>
+                                <a:srgbClr val="FF0000"/>
+                              </a:solidFill>
+                              <a:latin typeface="Cambria Math" panose="02040503050406030204" pitchFamily="18" charset="0"/>
+                            </a:rPr>
+                            <m:t>𝑗</m:t>
+                          </m:r>
+                        </m:e>
+                      </m:acc>
+                    </m:oMath>
+                  </m:oMathPara>
+                </a14:m>
+                <a:endParaRPr lang="ko-KR" altLang="en-US" dirty="0">
+                  <a:solidFill>
+                    <a:srgbClr val="FF0000"/>
+                  </a:solidFill>
+                </a:endParaRPr>
+              </a:p>
+            </p:txBody>
+          </p:sp>
+        </mc:Choice>
+        <mc:Fallback xmlns="">
+          <p:sp>
+            <p:nvSpPr>
+              <p:cNvPr id="19" name="TextBox 18">
+                <a:extLst>
+                  <a:ext uri="{FF2B5EF4-FFF2-40B4-BE49-F238E27FC236}">
+                    <a16:creationId xmlns:a16="http://schemas.microsoft.com/office/drawing/2014/main" id="{1EF1E73A-A1A2-46CC-B9EE-557B44FF9837}"/>
+                  </a:ext>
+                </a:extLst>
+              </p:cNvPr>
+              <p:cNvSpPr txBox="1">
+                <a:spLocks noRot="1" noChangeAspect="1" noMove="1" noResize="1" noEditPoints="1" noAdjustHandles="1" noChangeArrowheads="1" noChangeShapeType="1" noTextEdit="1"/>
+              </p:cNvSpPr>
+              <p:nvPr/>
+            </p:nvSpPr>
+            <p:spPr>
+              <a:xfrm>
+                <a:off x="5788433" y="375186"/>
+                <a:ext cx="1980800" cy="684868"/>
+              </a:xfrm>
+              <a:prstGeom prst="roundRect">
+                <a:avLst/>
+              </a:prstGeom>
+              <a:blipFill>
+                <a:blip r:embed="rId3"/>
+                <a:stretch>
+                  <a:fillRect/>
+                </a:stretch>
+              </a:blipFill>
+              <a:ln w="28575">
+                <a:solidFill>
+                  <a:srgbClr val="FF0000"/>
+                </a:solidFill>
+              </a:ln>
+            </p:spPr>
+            <p:txBody>
+              <a:bodyPr/>
+              <a:lstStyle/>
+              <a:p>
+                <a:r>
+                  <a:rPr lang="ko-KR" altLang="en-US">
+                    <a:noFill/>
+                  </a:rPr>
+                  <a:t> </a:t>
+                </a:r>
+              </a:p>
+            </p:txBody>
+          </p:sp>
+        </mc:Fallback>
+      </mc:AlternateContent>
+      <mc:AlternateContent xmlns:mc="http://schemas.openxmlformats.org/markup-compatibility/2006">
+        <mc:Choice xmlns:a14="http://schemas.microsoft.com/office/drawing/2010/main" Requires="a14">
+          <p:sp>
+            <p:nvSpPr>
+              <p:cNvPr id="2" name="직사각형 1">
+                <a:extLst>
+                  <a:ext uri="{FF2B5EF4-FFF2-40B4-BE49-F238E27FC236}">
+                    <a16:creationId xmlns:a16="http://schemas.microsoft.com/office/drawing/2014/main" id="{2157E34C-A273-45D8-88F9-CB3BE3EA5233}"/>
+                  </a:ext>
+                </a:extLst>
+              </p:cNvPr>
+              <p:cNvSpPr/>
+              <p:nvPr/>
+            </p:nvSpPr>
+            <p:spPr>
+              <a:xfrm>
+                <a:off x="6531341" y="2544330"/>
+                <a:ext cx="528543" cy="619016"/>
+              </a:xfrm>
+              <a:prstGeom prst="rect">
+                <a:avLst/>
+              </a:prstGeom>
+              <a:solidFill>
+                <a:schemeClr val="bg1"/>
+              </a:solidFill>
+              <a:ln>
+                <a:solidFill>
+                  <a:schemeClr val="accent1"/>
+                </a:solidFill>
+              </a:ln>
+            </p:spPr>
+            <p:txBody>
+              <a:bodyPr wrap="none">
+                <a:spAutoFit/>
+              </a:bodyPr>
+              <a:lstStyle/>
+              <a:p>
+                <a14:m>
+                  <m:oMathPara xmlns:m="http://schemas.openxmlformats.org/officeDocument/2006/math">
+                    <m:oMathParaPr>
+                      <m:jc m:val="centerGroup"/>
+                    </m:oMathParaPr>
+                    <m:oMath xmlns:m="http://schemas.openxmlformats.org/officeDocument/2006/math">
+                      <m:f>
+                        <m:fPr>
+                          <m:ctrlPr>
+                            <a:rPr lang="en-US" altLang="ko-KR" i="1" smtClean="0">
+                              <a:solidFill>
+                                <a:schemeClr val="tx1"/>
+                              </a:solidFill>
+                              <a:latin typeface="Cambria Math" panose="02040503050406030204" pitchFamily="18" charset="0"/>
+                            </a:rPr>
+                          </m:ctrlPr>
+                        </m:fPr>
+                        <m:num>
+                          <m:r>
+                            <a:rPr lang="en-US" altLang="ko-KR" i="1">
+                              <a:solidFill>
+                                <a:schemeClr val="tx1"/>
+                              </a:solidFill>
+                              <a:latin typeface="Cambria Math" panose="02040503050406030204" pitchFamily="18" charset="0"/>
+                            </a:rPr>
+                            <m:t>𝜕</m:t>
+                          </m:r>
+                          <m:r>
+                            <a:rPr lang="en-US" altLang="ko-KR" i="1">
+                              <a:solidFill>
+                                <a:schemeClr val="tx1"/>
+                              </a:solidFill>
+                              <a:latin typeface="Cambria Math" panose="02040503050406030204" pitchFamily="18" charset="0"/>
+                            </a:rPr>
+                            <m:t>𝑓</m:t>
+                          </m:r>
+                        </m:num>
+                        <m:den>
+                          <m:r>
+                            <a:rPr lang="en-US" altLang="ko-KR" i="1">
+                              <a:solidFill>
+                                <a:schemeClr val="tx1"/>
+                              </a:solidFill>
+                              <a:latin typeface="Cambria Math" panose="02040503050406030204" pitchFamily="18" charset="0"/>
+                            </a:rPr>
+                            <m:t>𝜕</m:t>
+                          </m:r>
+                          <m:r>
+                            <a:rPr lang="en-US" altLang="ko-KR" i="1">
+                              <a:solidFill>
+                                <a:schemeClr val="tx1"/>
+                              </a:solidFill>
+                              <a:latin typeface="Cambria Math" panose="02040503050406030204" pitchFamily="18" charset="0"/>
+                            </a:rPr>
+                            <m:t>𝑎</m:t>
+                          </m:r>
+                        </m:den>
+                      </m:f>
+                    </m:oMath>
+                  </m:oMathPara>
+                </a14:m>
+                <a:endParaRPr lang="ko-KR" altLang="en-US" dirty="0">
+                  <a:solidFill>
+                    <a:schemeClr val="tx1"/>
+                  </a:solidFill>
+                </a:endParaRPr>
+              </a:p>
+            </p:txBody>
+          </p:sp>
+        </mc:Choice>
+        <mc:Fallback>
+          <p:sp>
+            <p:nvSpPr>
+              <p:cNvPr id="2" name="직사각형 1">
+                <a:extLst>
+                  <a:ext uri="{FF2B5EF4-FFF2-40B4-BE49-F238E27FC236}">
+                    <a16:creationId xmlns:a16="http://schemas.microsoft.com/office/drawing/2014/main" id="{2157E34C-A273-45D8-88F9-CB3BE3EA5233}"/>
+                  </a:ext>
+                </a:extLst>
+              </p:cNvPr>
+              <p:cNvSpPr>
+                <a:spLocks noRot="1" noChangeAspect="1" noMove="1" noResize="1" noEditPoints="1" noAdjustHandles="1" noChangeArrowheads="1" noChangeShapeType="1" noTextEdit="1"/>
+              </p:cNvSpPr>
+              <p:nvPr/>
+            </p:nvSpPr>
+            <p:spPr>
+              <a:xfrm>
+                <a:off x="6531341" y="2544330"/>
+                <a:ext cx="528543" cy="619016"/>
+              </a:xfrm>
+              <a:prstGeom prst="rect">
+                <a:avLst/>
+              </a:prstGeom>
+              <a:blipFill>
+                <a:blip r:embed="rId4"/>
+                <a:stretch>
+                  <a:fillRect/>
+                </a:stretch>
+              </a:blipFill>
+              <a:ln>
+                <a:solidFill>
+                  <a:schemeClr val="accent1"/>
+                </a:solidFill>
+              </a:ln>
+            </p:spPr>
+            <p:txBody>
+              <a:bodyPr/>
+              <a:lstStyle/>
+              <a:p>
+                <a:r>
+                  <a:rPr lang="ko-KR" altLang="en-US">
+                    <a:noFill/>
+                  </a:rPr>
+                  <a:t> </a:t>
+                </a:r>
+              </a:p>
+            </p:txBody>
+          </p:sp>
+        </mc:Fallback>
+      </mc:AlternateContent>
+      <mc:AlternateContent xmlns:mc="http://schemas.openxmlformats.org/markup-compatibility/2006">
+        <mc:Choice xmlns:a14="http://schemas.microsoft.com/office/drawing/2010/main" Requires="a14">
+          <p:sp>
+            <p:nvSpPr>
+              <p:cNvPr id="10" name="직사각형 9">
+                <a:extLst>
+                  <a:ext uri="{FF2B5EF4-FFF2-40B4-BE49-F238E27FC236}">
+                    <a16:creationId xmlns:a16="http://schemas.microsoft.com/office/drawing/2014/main" id="{FDE39ECF-7000-44FD-9EA5-249EF058459A}"/>
+                  </a:ext>
+                </a:extLst>
+              </p:cNvPr>
+              <p:cNvSpPr/>
+              <p:nvPr/>
+            </p:nvSpPr>
+            <p:spPr>
+              <a:xfrm>
+                <a:off x="7129737" y="1628800"/>
+                <a:ext cx="528029" cy="619016"/>
+              </a:xfrm>
+              <a:prstGeom prst="rect">
+                <a:avLst/>
+              </a:prstGeom>
+              <a:solidFill>
+                <a:schemeClr val="bg1"/>
+              </a:solidFill>
+              <a:ln>
+                <a:solidFill>
+                  <a:schemeClr val="accent1"/>
+                </a:solidFill>
+              </a:ln>
+            </p:spPr>
+            <p:txBody>
+              <a:bodyPr wrap="none">
+                <a:spAutoFit/>
+              </a:bodyPr>
+              <a:lstStyle/>
+              <a:p>
+                <a14:m>
+                  <m:oMathPara xmlns:m="http://schemas.openxmlformats.org/officeDocument/2006/math">
+                    <m:oMathParaPr>
+                      <m:jc m:val="centerGroup"/>
+                    </m:oMathParaPr>
+                    <m:oMath xmlns:m="http://schemas.openxmlformats.org/officeDocument/2006/math">
+                      <m:f>
+                        <m:fPr>
+                          <m:ctrlPr>
+                            <a:rPr lang="en-US" altLang="ko-KR" i="1" smtClean="0">
+                              <a:solidFill>
+                                <a:schemeClr val="tx1"/>
+                              </a:solidFill>
+                              <a:latin typeface="Cambria Math" panose="02040503050406030204" pitchFamily="18" charset="0"/>
+                            </a:rPr>
+                          </m:ctrlPr>
+                        </m:fPr>
+                        <m:num>
+                          <m:r>
+                            <a:rPr lang="en-US" altLang="ko-KR" i="1">
+                              <a:solidFill>
+                                <a:schemeClr val="tx1"/>
+                              </a:solidFill>
+                              <a:latin typeface="Cambria Math" panose="02040503050406030204" pitchFamily="18" charset="0"/>
+                            </a:rPr>
+                            <m:t>𝜕</m:t>
+                          </m:r>
+                          <m:r>
+                            <a:rPr lang="en-US" altLang="ko-KR" i="1">
+                              <a:solidFill>
+                                <a:schemeClr val="tx1"/>
+                              </a:solidFill>
+                              <a:latin typeface="Cambria Math" panose="02040503050406030204" pitchFamily="18" charset="0"/>
+                            </a:rPr>
+                            <m:t>𝑓</m:t>
+                          </m:r>
+                        </m:num>
+                        <m:den>
+                          <m:r>
+                            <a:rPr lang="en-US" altLang="ko-KR" i="1">
+                              <a:solidFill>
+                                <a:schemeClr val="tx1"/>
+                              </a:solidFill>
+                              <a:latin typeface="Cambria Math" panose="02040503050406030204" pitchFamily="18" charset="0"/>
+                            </a:rPr>
+                            <m:t>𝜕</m:t>
+                          </m:r>
+                          <m:r>
+                            <a:rPr lang="en-US" altLang="ko-KR" b="0" i="1" smtClean="0">
+                              <a:solidFill>
+                                <a:schemeClr val="tx1"/>
+                              </a:solidFill>
+                              <a:latin typeface="Cambria Math" panose="02040503050406030204" pitchFamily="18" charset="0"/>
+                            </a:rPr>
+                            <m:t>𝑏</m:t>
+                          </m:r>
+                        </m:den>
+                      </m:f>
+                    </m:oMath>
+                  </m:oMathPara>
+                </a14:m>
+                <a:endParaRPr lang="ko-KR" altLang="en-US" dirty="0">
+                  <a:solidFill>
+                    <a:schemeClr val="tx1"/>
+                  </a:solidFill>
+                </a:endParaRPr>
+              </a:p>
+            </p:txBody>
+          </p:sp>
+        </mc:Choice>
+        <mc:Fallback>
+          <p:sp>
+            <p:nvSpPr>
+              <p:cNvPr id="10" name="직사각형 9">
+                <a:extLst>
+                  <a:ext uri="{FF2B5EF4-FFF2-40B4-BE49-F238E27FC236}">
+                    <a16:creationId xmlns:a16="http://schemas.microsoft.com/office/drawing/2014/main" id="{FDE39ECF-7000-44FD-9EA5-249EF058459A}"/>
+                  </a:ext>
+                </a:extLst>
+              </p:cNvPr>
+              <p:cNvSpPr>
+                <a:spLocks noRot="1" noChangeAspect="1" noMove="1" noResize="1" noEditPoints="1" noAdjustHandles="1" noChangeArrowheads="1" noChangeShapeType="1" noTextEdit="1"/>
+              </p:cNvSpPr>
+              <p:nvPr/>
+            </p:nvSpPr>
+            <p:spPr>
+              <a:xfrm>
+                <a:off x="7129737" y="1628800"/>
+                <a:ext cx="528029" cy="619016"/>
+              </a:xfrm>
+              <a:prstGeom prst="rect">
+                <a:avLst/>
+              </a:prstGeom>
+              <a:blipFill>
+                <a:blip r:embed="rId5"/>
+                <a:stretch>
+                  <a:fillRect/>
+                </a:stretch>
+              </a:blipFill>
+              <a:ln>
+                <a:solidFill>
+                  <a:schemeClr val="accent1"/>
+                </a:solidFill>
+              </a:ln>
+            </p:spPr>
+            <p:txBody>
+              <a:bodyPr/>
+              <a:lstStyle/>
+              <a:p>
+                <a:r>
+                  <a:rPr lang="ko-KR" altLang="en-US">
+                    <a:noFill/>
+                  </a:rPr>
+                  <a:t> </a:t>
+                </a:r>
+              </a:p>
+            </p:txBody>
+          </p:sp>
+        </mc:Fallback>
+      </mc:AlternateContent>
+    </p:spTree>
+    <p:extLst>
+      <p:ext uri="{BB962C8B-B14F-4D97-AF65-F5344CB8AC3E}">
+        <p14:creationId xmlns:p14="http://schemas.microsoft.com/office/powerpoint/2010/main" val="3237231551"/>
+      </p:ext>
+    </p:extLst>
+  </p:cSld>
+  <p:clrMapOvr>
+    <a:masterClrMapping/>
+  </p:clrMapOvr>
+</p:sld>
+</file>
+
+<file path=ppt/slides/slide7.xml><?xml version="1.0" encoding="utf-8"?>
+<p:sld xmlns:a="http://schemas.openxmlformats.org/drawingml/2006/main" xmlns:r="http://schemas.openxmlformats.org/officeDocument/2006/relationships" xmlns:p="http://schemas.openxmlformats.org/presentationml/2006/main">
+  <p:cSld>
+    <p:spTree>
+      <p:nvGrpSpPr>
+        <p:cNvPr id="1" name=""/>
+        <p:cNvGrpSpPr/>
+        <p:nvPr/>
+      </p:nvGrpSpPr>
+      <p:grpSpPr>
+        <a:xfrm>
+          <a:off x="0" y="0"/>
+          <a:ext cx="0" cy="0"/>
+          <a:chOff x="0" y="0"/>
+          <a:chExt cx="0" cy="0"/>
+        </a:xfrm>
+      </p:grpSpPr>
+      <p:pic>
+        <p:nvPicPr>
+          <p:cNvPr id="4" name="그림 3">
+            <a:extLst>
+              <a:ext uri="{FF2B5EF4-FFF2-40B4-BE49-F238E27FC236}">
+                <a16:creationId xmlns:a16="http://schemas.microsoft.com/office/drawing/2014/main" id="{10E61BF7-6D64-4BCA-8C7D-B78E0F7B967E}"/>
+              </a:ext>
+            </a:extLst>
+          </p:cNvPr>
+          <p:cNvPicPr>
+            <a:picLocks noChangeAspect="1"/>
+          </p:cNvPicPr>
+          <p:nvPr/>
+        </p:nvPicPr>
+        <p:blipFill>
+          <a:blip r:embed="rId2"/>
+          <a:stretch>
+            <a:fillRect/>
+          </a:stretch>
+        </p:blipFill>
+        <p:spPr>
+          <a:xfrm>
+            <a:off x="716086" y="548680"/>
+            <a:ext cx="7711828" cy="5760640"/>
+          </a:xfrm>
+          <a:prstGeom prst="rect">
+            <a:avLst/>
+          </a:prstGeom>
+        </p:spPr>
+      </p:pic>
+      <p:cxnSp>
+        <p:nvCxnSpPr>
+          <p:cNvPr id="6" name="직선 화살표 연결선 5">
+            <a:extLst>
+              <a:ext uri="{FF2B5EF4-FFF2-40B4-BE49-F238E27FC236}">
+                <a16:creationId xmlns:a16="http://schemas.microsoft.com/office/drawing/2014/main" id="{31E02640-3ED4-4F61-B737-2EF5C1DB1C39}"/>
+              </a:ext>
+            </a:extLst>
+          </p:cNvPr>
+          <p:cNvCxnSpPr>
+            <a:cxnSpLocks/>
+          </p:cNvCxnSpPr>
+          <p:nvPr/>
+        </p:nvCxnSpPr>
+        <p:spPr>
+          <a:xfrm flipH="1">
+            <a:off x="5990980" y="2472323"/>
+            <a:ext cx="525235" cy="1275570"/>
+          </a:xfrm>
+          <a:prstGeom prst="straightConnector1">
+            <a:avLst/>
+          </a:prstGeom>
+          <a:ln w="57150">
+            <a:solidFill>
+              <a:srgbClr val="FF0000"/>
+            </a:solidFill>
+            <a:tailEnd type="triangle"/>
+          </a:ln>
+        </p:spPr>
+        <p:style>
+          <a:lnRef idx="1">
+            <a:schemeClr val="accent1"/>
+          </a:lnRef>
+          <a:fillRef idx="0">
+            <a:schemeClr val="accent1"/>
+          </a:fillRef>
+          <a:effectRef idx="0">
+            <a:schemeClr val="accent1"/>
+          </a:effectRef>
+          <a:fontRef idx="minor">
+            <a:schemeClr val="tx1"/>
+          </a:fontRef>
+        </p:style>
+      </p:cxnSp>
+      <p:sp>
+        <p:nvSpPr>
+          <p:cNvPr id="16" name="타원 15">
+            <a:extLst>
+              <a:ext uri="{FF2B5EF4-FFF2-40B4-BE49-F238E27FC236}">
+                <a16:creationId xmlns:a16="http://schemas.microsoft.com/office/drawing/2014/main" id="{32D03930-9FCF-4D8B-87ED-F30EDB5C7172}"/>
+              </a:ext>
+            </a:extLst>
+          </p:cNvPr>
+          <p:cNvSpPr/>
+          <p:nvPr/>
+        </p:nvSpPr>
+        <p:spPr>
+          <a:xfrm>
+            <a:off x="6444206" y="2400314"/>
+            <a:ext cx="144018" cy="144018"/>
+          </a:xfrm>
+          <a:prstGeom prst="ellipse">
+            <a:avLst/>
+          </a:prstGeom>
+          <a:solidFill>
+            <a:schemeClr val="tx1"/>
+          </a:solidFill>
+          <a:ln>
+            <a:noFill/>
+          </a:ln>
+        </p:spPr>
+        <p:style>
+          <a:lnRef idx="2">
+            <a:schemeClr val="accent1">
+              <a:shade val="50000"/>
+            </a:schemeClr>
+          </a:lnRef>
+          <a:fillRef idx="1">
+            <a:schemeClr val="accent1"/>
+          </a:fillRef>
+          <a:effectRef idx="0">
+            <a:schemeClr val="accent1"/>
+          </a:effectRef>
+          <a:fontRef idx="minor">
+            <a:schemeClr val="lt1"/>
+          </a:fontRef>
+        </p:style>
+        <p:txBody>
+          <a:bodyPr rtlCol="0" anchor="ctr"/>
+          <a:lstStyle/>
+          <a:p>
+            <a:pPr algn="ctr"/>
+            <a:endParaRPr lang="ko-KR" altLang="en-US"/>
+          </a:p>
+        </p:txBody>
+      </p:sp>
+      <p:sp>
+        <p:nvSpPr>
+          <p:cNvPr id="18" name="TextBox 17">
+            <a:extLst>
+              <a:ext uri="{FF2B5EF4-FFF2-40B4-BE49-F238E27FC236}">
+                <a16:creationId xmlns:a16="http://schemas.microsoft.com/office/drawing/2014/main" id="{E2645862-4FE8-47BA-B75C-ED42449A68DD}"/>
+              </a:ext>
+            </a:extLst>
+          </p:cNvPr>
+          <p:cNvSpPr txBox="1"/>
+          <p:nvPr/>
+        </p:nvSpPr>
+        <p:spPr>
+          <a:xfrm>
+            <a:off x="5724128" y="1557912"/>
+            <a:ext cx="1936857" cy="715089"/>
+          </a:xfrm>
+          <a:prstGeom prst="roundRect">
+            <a:avLst/>
+          </a:prstGeom>
+          <a:solidFill>
+            <a:schemeClr val="bg1"/>
+          </a:solidFill>
+          <a:ln>
+            <a:solidFill>
+              <a:schemeClr val="tx1"/>
+            </a:solidFill>
+          </a:ln>
+        </p:spPr>
+        <p:txBody>
+          <a:bodyPr wrap="none" rtlCol="0">
+            <a:spAutoFit/>
+          </a:bodyPr>
+          <a:lstStyle/>
+          <a:p>
+            <a:pPr algn="ctr"/>
+            <a:r>
+              <a:rPr lang="ko-KR" altLang="en-US" dirty="0"/>
+              <a:t>랜덤하게 배정된</a:t>
+            </a:r>
+            <a:endParaRPr lang="en-US" altLang="ko-KR" dirty="0"/>
+          </a:p>
+          <a:p>
+            <a:pPr algn="ctr"/>
+            <a:r>
+              <a:rPr lang="ko-KR" altLang="en-US" dirty="0"/>
+              <a:t>시작 포인트</a:t>
+            </a:r>
+          </a:p>
+        </p:txBody>
+      </p:sp>
+      <mc:AlternateContent xmlns:mc="http://schemas.openxmlformats.org/markup-compatibility/2006">
+        <mc:Choice xmlns:a14="http://schemas.microsoft.com/office/drawing/2010/main" Requires="a14">
+          <p:sp>
+            <p:nvSpPr>
+              <p:cNvPr id="19" name="TextBox 18">
+                <a:extLst>
+                  <a:ext uri="{FF2B5EF4-FFF2-40B4-BE49-F238E27FC236}">
+                    <a16:creationId xmlns:a16="http://schemas.microsoft.com/office/drawing/2014/main" id="{1EF1E73A-A1A2-46CC-B9EE-557B44FF9837}"/>
+                  </a:ext>
+                </a:extLst>
+              </p:cNvPr>
+              <p:cNvSpPr txBox="1"/>
+              <p:nvPr/>
+            </p:nvSpPr>
+            <p:spPr>
+              <a:xfrm>
+                <a:off x="6491825" y="3029189"/>
+                <a:ext cx="2598707" cy="790713"/>
+              </a:xfrm>
+              <a:prstGeom prst="roundRect">
+                <a:avLst/>
+              </a:prstGeom>
+              <a:solidFill>
+                <a:schemeClr val="bg1"/>
+              </a:solidFill>
+              <a:ln w="28575">
+                <a:solidFill>
+                  <a:srgbClr val="FF0000"/>
+                </a:solidFill>
+              </a:ln>
+            </p:spPr>
+            <p:txBody>
+              <a:bodyPr wrap="none" rtlCol="0">
+                <a:spAutoFit/>
+              </a:bodyPr>
+              <a:lstStyle/>
+              <a:p>
+                <a:pPr algn="ctr"/>
+                <a14:m>
+                  <m:oMathPara xmlns:m="http://schemas.openxmlformats.org/officeDocument/2006/math">
+                    <m:oMathParaPr>
+                      <m:jc m:val="centerGroup"/>
+                    </m:oMathParaPr>
+                    <m:oMath xmlns:m="http://schemas.openxmlformats.org/officeDocument/2006/math">
+                      <m:r>
+                        <a:rPr lang="en-US" altLang="ko-KR" b="0" i="0" smtClean="0">
+                          <a:solidFill>
+                            <a:srgbClr val="FF0000"/>
+                          </a:solidFill>
+                          <a:latin typeface="Cambria Math" panose="02040503050406030204" pitchFamily="18" charset="0"/>
+                        </a:rPr>
+                        <m:t>−</m:t>
+                      </m:r>
+                      <m:r>
+                        <m:rPr>
+                          <m:sty m:val="p"/>
+                        </m:rPr>
+                        <a:rPr lang="en-US" altLang="ko-KR" b="0" i="0" smtClean="0">
+                          <a:solidFill>
+                            <a:srgbClr val="FF0000"/>
+                          </a:solidFill>
+                          <a:latin typeface="Cambria Math" panose="02040503050406030204" pitchFamily="18" charset="0"/>
+                        </a:rPr>
+                        <m:t>∇</m:t>
+                      </m:r>
+                      <m:r>
+                        <a:rPr lang="en-US" altLang="ko-KR" b="0" i="1" smtClean="0">
+                          <a:solidFill>
+                            <a:srgbClr val="FF0000"/>
+                          </a:solidFill>
+                          <a:latin typeface="Cambria Math" panose="02040503050406030204" pitchFamily="18" charset="0"/>
+                        </a:rPr>
+                        <m:t>𝑓</m:t>
+                      </m:r>
+                      <m:r>
+                        <a:rPr lang="en-US" altLang="ko-KR" b="0" i="1" smtClean="0">
+                          <a:solidFill>
+                            <a:srgbClr val="FF0000"/>
+                          </a:solidFill>
+                          <a:latin typeface="Cambria Math" panose="02040503050406030204" pitchFamily="18" charset="0"/>
+                        </a:rPr>
+                        <m:t>=−</m:t>
+                      </m:r>
+                      <m:d>
+                        <m:dPr>
+                          <m:ctrlPr>
+                            <a:rPr lang="en-US" altLang="ko-KR" b="0" i="1" smtClean="0">
+                              <a:solidFill>
+                                <a:srgbClr val="FF0000"/>
+                              </a:solidFill>
+                              <a:latin typeface="Cambria Math" panose="02040503050406030204" pitchFamily="18" charset="0"/>
+                            </a:rPr>
+                          </m:ctrlPr>
+                        </m:dPr>
+                        <m:e>
+                          <m:f>
+                            <m:fPr>
+                              <m:ctrlPr>
+                                <a:rPr lang="en-US" altLang="ko-KR" i="1">
+                                  <a:solidFill>
+                                    <a:srgbClr val="FF0000"/>
+                                  </a:solidFill>
+                                  <a:latin typeface="Cambria Math" panose="02040503050406030204" pitchFamily="18" charset="0"/>
+                                </a:rPr>
+                              </m:ctrlPr>
+                            </m:fPr>
+                            <m:num>
+                              <m:r>
+                                <a:rPr lang="en-US" altLang="ko-KR" i="1">
+                                  <a:solidFill>
+                                    <a:srgbClr val="FF0000"/>
+                                  </a:solidFill>
+                                  <a:latin typeface="Cambria Math" panose="02040503050406030204" pitchFamily="18" charset="0"/>
+                                </a:rPr>
+                                <m:t>𝜕</m:t>
+                              </m:r>
+                              <m:r>
+                                <a:rPr lang="en-US" altLang="ko-KR" i="1">
+                                  <a:solidFill>
+                                    <a:srgbClr val="FF0000"/>
+                                  </a:solidFill>
+                                  <a:latin typeface="Cambria Math" panose="02040503050406030204" pitchFamily="18" charset="0"/>
+                                </a:rPr>
+                                <m:t>𝑓</m:t>
+                              </m:r>
+                            </m:num>
+                            <m:den>
+                              <m:r>
+                                <a:rPr lang="en-US" altLang="ko-KR" i="1">
+                                  <a:solidFill>
+                                    <a:srgbClr val="FF0000"/>
+                                  </a:solidFill>
+                                  <a:latin typeface="Cambria Math" panose="02040503050406030204" pitchFamily="18" charset="0"/>
+                                </a:rPr>
+                                <m:t>𝜕</m:t>
+                              </m:r>
+                              <m:r>
+                                <a:rPr lang="en-US" altLang="ko-KR" i="1">
+                                  <a:solidFill>
+                                    <a:srgbClr val="FF0000"/>
+                                  </a:solidFill>
+                                  <a:latin typeface="Cambria Math" panose="02040503050406030204" pitchFamily="18" charset="0"/>
+                                </a:rPr>
+                                <m:t>𝑎</m:t>
+                              </m:r>
+                            </m:den>
+                          </m:f>
+                          <m:acc>
+                            <m:accPr>
+                              <m:chr m:val="̂"/>
+                              <m:ctrlPr>
+                                <a:rPr lang="en-US" altLang="ko-KR" b="0" i="1" smtClean="0">
+                                  <a:solidFill>
+                                    <a:srgbClr val="FF0000"/>
+                                  </a:solidFill>
+                                  <a:latin typeface="Cambria Math" panose="02040503050406030204" pitchFamily="18" charset="0"/>
+                                </a:rPr>
+                              </m:ctrlPr>
+                            </m:accPr>
+                            <m:e>
+                              <m:r>
+                                <a:rPr lang="en-US" altLang="ko-KR" b="0" i="1" smtClean="0">
+                                  <a:solidFill>
+                                    <a:srgbClr val="FF0000"/>
+                                  </a:solidFill>
+                                  <a:latin typeface="Cambria Math" panose="02040503050406030204" pitchFamily="18" charset="0"/>
+                                </a:rPr>
+                                <m:t>𝑖</m:t>
+                              </m:r>
+                            </m:e>
+                          </m:acc>
+                          <m:r>
+                            <a:rPr lang="en-US" altLang="ko-KR" b="0" i="0" smtClean="0">
+                              <a:solidFill>
+                                <a:srgbClr val="FF0000"/>
+                              </a:solidFill>
+                              <a:latin typeface="Cambria Math" panose="02040503050406030204" pitchFamily="18" charset="0"/>
+                            </a:rPr>
+                            <m:t>+</m:t>
+                          </m:r>
+                          <m:f>
+                            <m:fPr>
+                              <m:ctrlPr>
+                                <a:rPr lang="en-US" altLang="ko-KR" i="1">
+                                  <a:solidFill>
+                                    <a:srgbClr val="FF0000"/>
+                                  </a:solidFill>
+                                  <a:latin typeface="Cambria Math" panose="02040503050406030204" pitchFamily="18" charset="0"/>
+                                </a:rPr>
+                              </m:ctrlPr>
+                            </m:fPr>
+                            <m:num>
+                              <m:r>
+                                <a:rPr lang="en-US" altLang="ko-KR" i="1">
+                                  <a:solidFill>
+                                    <a:srgbClr val="FF0000"/>
+                                  </a:solidFill>
+                                  <a:latin typeface="Cambria Math" panose="02040503050406030204" pitchFamily="18" charset="0"/>
+                                </a:rPr>
+                                <m:t>𝜕</m:t>
+                              </m:r>
+                              <m:r>
+                                <a:rPr lang="en-US" altLang="ko-KR" i="1">
+                                  <a:solidFill>
+                                    <a:srgbClr val="FF0000"/>
+                                  </a:solidFill>
+                                  <a:latin typeface="Cambria Math" panose="02040503050406030204" pitchFamily="18" charset="0"/>
+                                </a:rPr>
+                                <m:t>𝑓</m:t>
+                              </m:r>
+                            </m:num>
+                            <m:den>
+                              <m:r>
+                                <a:rPr lang="en-US" altLang="ko-KR" i="1">
+                                  <a:solidFill>
+                                    <a:srgbClr val="FF0000"/>
+                                  </a:solidFill>
+                                  <a:latin typeface="Cambria Math" panose="02040503050406030204" pitchFamily="18" charset="0"/>
+                                </a:rPr>
+                                <m:t>𝜕</m:t>
+                              </m:r>
+                              <m:r>
+                                <a:rPr lang="en-US" altLang="ko-KR" i="1">
+                                  <a:solidFill>
+                                    <a:srgbClr val="FF0000"/>
+                                  </a:solidFill>
+                                  <a:latin typeface="Cambria Math" panose="02040503050406030204" pitchFamily="18" charset="0"/>
+                                </a:rPr>
+                                <m:t>𝑏</m:t>
+                              </m:r>
+                            </m:den>
+                          </m:f>
+                          <m:acc>
+                            <m:accPr>
+                              <m:chr m:val="̂"/>
+                              <m:ctrlPr>
+                                <a:rPr lang="en-US" altLang="ko-KR" b="0" i="1" smtClean="0">
+                                  <a:solidFill>
+                                    <a:srgbClr val="FF0000"/>
+                                  </a:solidFill>
+                                  <a:latin typeface="Cambria Math" panose="02040503050406030204" pitchFamily="18" charset="0"/>
+                                </a:rPr>
+                              </m:ctrlPr>
+                            </m:accPr>
+                            <m:e>
+                              <m:r>
+                                <a:rPr lang="en-US" altLang="ko-KR" b="0" i="1" smtClean="0">
+                                  <a:solidFill>
+                                    <a:srgbClr val="FF0000"/>
+                                  </a:solidFill>
+                                  <a:latin typeface="Cambria Math" panose="02040503050406030204" pitchFamily="18" charset="0"/>
+                                </a:rPr>
+                                <m:t>𝑗</m:t>
+                              </m:r>
+                            </m:e>
+                          </m:acc>
+                        </m:e>
+                      </m:d>
+                    </m:oMath>
+                  </m:oMathPara>
+                </a14:m>
+                <a:endParaRPr lang="ko-KR" altLang="en-US" dirty="0">
+                  <a:solidFill>
+                    <a:srgbClr val="FF0000"/>
+                  </a:solidFill>
+                </a:endParaRPr>
+              </a:p>
+            </p:txBody>
+          </p:sp>
+        </mc:Choice>
+        <mc:Fallback>
+          <p:sp>
+            <p:nvSpPr>
+              <p:cNvPr id="19" name="TextBox 18">
+                <a:extLst>
+                  <a:ext uri="{FF2B5EF4-FFF2-40B4-BE49-F238E27FC236}">
+                    <a16:creationId xmlns:a16="http://schemas.microsoft.com/office/drawing/2014/main" id="{1EF1E73A-A1A2-46CC-B9EE-557B44FF9837}"/>
+                  </a:ext>
+                </a:extLst>
+              </p:cNvPr>
+              <p:cNvSpPr txBox="1">
+                <a:spLocks noRot="1" noChangeAspect="1" noMove="1" noResize="1" noEditPoints="1" noAdjustHandles="1" noChangeArrowheads="1" noChangeShapeType="1" noTextEdit="1"/>
+              </p:cNvSpPr>
+              <p:nvPr/>
+            </p:nvSpPr>
+            <p:spPr>
+              <a:xfrm>
+                <a:off x="6491825" y="3029189"/>
+                <a:ext cx="2598707" cy="790713"/>
+              </a:xfrm>
+              <a:prstGeom prst="roundRect">
+                <a:avLst/>
+              </a:prstGeom>
+              <a:blipFill>
+                <a:blip r:embed="rId3"/>
+                <a:stretch>
+                  <a:fillRect/>
+                </a:stretch>
+              </a:blipFill>
+              <a:ln w="28575">
+                <a:solidFill>
+                  <a:srgbClr val="FF0000"/>
+                </a:solidFill>
+              </a:ln>
+            </p:spPr>
+            <p:txBody>
+              <a:bodyPr/>
+              <a:lstStyle/>
+              <a:p>
+                <a:r>
+                  <a:rPr lang="ko-KR" altLang="en-US">
+                    <a:noFill/>
+                  </a:rPr>
+                  <a:t> </a:t>
+                </a:r>
+              </a:p>
+            </p:txBody>
+          </p:sp>
+        </mc:Fallback>
+      </mc:AlternateContent>
+      <p:sp>
+        <p:nvSpPr>
+          <p:cNvPr id="8" name="별: 꼭짓점 5개 7">
+            <a:extLst>
+              <a:ext uri="{FF2B5EF4-FFF2-40B4-BE49-F238E27FC236}">
+                <a16:creationId xmlns:a16="http://schemas.microsoft.com/office/drawing/2014/main" id="{989068DF-F269-4CAC-B848-08BF15A61958}"/>
+              </a:ext>
+            </a:extLst>
+          </p:cNvPr>
+          <p:cNvSpPr/>
+          <p:nvPr/>
+        </p:nvSpPr>
+        <p:spPr>
+          <a:xfrm>
+            <a:off x="4427984" y="3147225"/>
+            <a:ext cx="288032" cy="292488"/>
+          </a:xfrm>
+          <a:prstGeom prst="star5">
+            <a:avLst/>
+          </a:prstGeom>
+          <a:solidFill>
+            <a:srgbClr val="FF0000"/>
+          </a:solidFill>
+          <a:ln>
+            <a:noFill/>
+          </a:ln>
+        </p:spPr>
+        <p:style>
+          <a:lnRef idx="2">
+            <a:schemeClr val="accent1">
+              <a:shade val="50000"/>
+            </a:schemeClr>
+          </a:lnRef>
+          <a:fillRef idx="1">
+            <a:schemeClr val="accent1"/>
+          </a:fillRef>
+          <a:effectRef idx="0">
+            <a:schemeClr val="accent1"/>
+          </a:effectRef>
+          <a:fontRef idx="minor">
+            <a:schemeClr val="lt1"/>
+          </a:fontRef>
+        </p:style>
+        <p:txBody>
+          <a:bodyPr rtlCol="0" anchor="ctr"/>
+          <a:lstStyle/>
+          <a:p>
+            <a:pPr algn="ctr"/>
+            <a:endParaRPr lang="ko-KR" altLang="en-US"/>
+          </a:p>
+        </p:txBody>
+      </p:sp>
+    </p:spTree>
+    <p:extLst>
+      <p:ext uri="{BB962C8B-B14F-4D97-AF65-F5344CB8AC3E}">
+        <p14:creationId xmlns:p14="http://schemas.microsoft.com/office/powerpoint/2010/main" val="1319010260"/>
+      </p:ext>
+    </p:extLst>
+  </p:cSld>
+  <p:clrMapOvr>
+    <a:masterClrMapping/>
+  </p:clrMapOvr>
+</p:sld>
+</file>
+
 <file path=ppt/theme/theme1.xml><?xml version="1.0" encoding="utf-8"?>
 <a:theme xmlns:a="http://schemas.openxmlformats.org/drawingml/2006/main" name="Office 테마">
   <a:themeElements>

</xml_diff>